<commit_message>
Minor slide updates, up to lecture 7.
</commit_message>
<xml_diff>
--- a/doc/advanced/slides/lesson_06.pptx
+++ b/doc/advanced/slides/lesson_06.pptx
@@ -232,7 +232,7 @@
           <a:p>
             <a:fld id="{9B5B52BA-3295-0343-9E28-A260A811DD10}" type="datetimeFigureOut">
               <a:rPr lang="en-US" smtClean="0"/>
-              <a:t>16-Aug-19</a:t>
+              <a:t>10/4/21</a:t>
             </a:fld>
             <a:endParaRPr lang="en-US"/>
           </a:p>
@@ -712,7 +712,7 @@
           <a:p>
             <a:fld id="{04F1D4A2-813C-F741-B481-C92B3A596030}" type="datetimeFigureOut">
               <a:rPr lang="en-US" smtClean="0"/>
-              <a:t>16-Aug-19</a:t>
+              <a:t>10/4/21</a:t>
             </a:fld>
             <a:endParaRPr lang="en-US"/>
           </a:p>
@@ -880,7 +880,7 @@
           <a:p>
             <a:fld id="{04F1D4A2-813C-F741-B481-C92B3A596030}" type="datetimeFigureOut">
               <a:rPr lang="en-US" smtClean="0"/>
-              <a:t>16-Aug-19</a:t>
+              <a:t>10/4/21</a:t>
             </a:fld>
             <a:endParaRPr lang="en-US"/>
           </a:p>
@@ -1058,7 +1058,7 @@
           <a:p>
             <a:fld id="{04F1D4A2-813C-F741-B481-C92B3A596030}" type="datetimeFigureOut">
               <a:rPr lang="en-US" smtClean="0"/>
-              <a:t>16-Aug-19</a:t>
+              <a:t>10/4/21</a:t>
             </a:fld>
             <a:endParaRPr lang="en-US"/>
           </a:p>
@@ -1395,7 +1395,7 @@
           <a:p>
             <a:fld id="{04F1D4A2-813C-F741-B481-C92B3A596030}" type="datetimeFigureOut">
               <a:rPr lang="en-US" smtClean="0"/>
-              <a:t>16-Aug-19</a:t>
+              <a:t>10/4/21</a:t>
             </a:fld>
             <a:endParaRPr lang="en-US"/>
           </a:p>
@@ -1640,7 +1640,7 @@
           <a:p>
             <a:fld id="{04F1D4A2-813C-F741-B481-C92B3A596030}" type="datetimeFigureOut">
               <a:rPr lang="en-US" smtClean="0"/>
-              <a:t>16-Aug-19</a:t>
+              <a:t>10/4/21</a:t>
             </a:fld>
             <a:endParaRPr lang="en-US"/>
           </a:p>
@@ -1869,7 +1869,7 @@
           <a:p>
             <a:fld id="{04F1D4A2-813C-F741-B481-C92B3A596030}" type="datetimeFigureOut">
               <a:rPr lang="en-US" smtClean="0"/>
-              <a:t>16-Aug-19</a:t>
+              <a:t>10/4/21</a:t>
             </a:fld>
             <a:endParaRPr lang="en-US"/>
           </a:p>
@@ -2233,7 +2233,7 @@
           <a:p>
             <a:fld id="{04F1D4A2-813C-F741-B481-C92B3A596030}" type="datetimeFigureOut">
               <a:rPr lang="en-US" smtClean="0"/>
-              <a:t>16-Aug-19</a:t>
+              <a:t>10/4/21</a:t>
             </a:fld>
             <a:endParaRPr lang="en-US"/>
           </a:p>
@@ -2350,7 +2350,7 @@
           <a:p>
             <a:fld id="{04F1D4A2-813C-F741-B481-C92B3A596030}" type="datetimeFigureOut">
               <a:rPr lang="en-US" smtClean="0"/>
-              <a:t>16-Aug-19</a:t>
+              <a:t>10/4/21</a:t>
             </a:fld>
             <a:endParaRPr lang="en-US"/>
           </a:p>
@@ -2445,7 +2445,7 @@
           <a:p>
             <a:fld id="{04F1D4A2-813C-F741-B481-C92B3A596030}" type="datetimeFigureOut">
               <a:rPr lang="en-US" smtClean="0"/>
-              <a:t>16-Aug-19</a:t>
+              <a:t>10/4/21</a:t>
             </a:fld>
             <a:endParaRPr lang="en-US"/>
           </a:p>
@@ -2720,7 +2720,7 @@
           <a:p>
             <a:fld id="{04F1D4A2-813C-F741-B481-C92B3A596030}" type="datetimeFigureOut">
               <a:rPr lang="en-US" smtClean="0"/>
-              <a:t>16-Aug-19</a:t>
+              <a:t>10/4/21</a:t>
             </a:fld>
             <a:endParaRPr lang="en-US"/>
           </a:p>
@@ -2972,7 +2972,7 @@
           <a:p>
             <a:fld id="{04F1D4A2-813C-F741-B481-C92B3A596030}" type="datetimeFigureOut">
               <a:rPr lang="en-US" smtClean="0"/>
-              <a:t>16-Aug-19</a:t>
+              <a:t>10/4/21</a:t>
             </a:fld>
             <a:endParaRPr lang="en-US"/>
           </a:p>
@@ -3183,7 +3183,7 @@
           <a:p>
             <a:fld id="{04F1D4A2-813C-F741-B481-C92B3A596030}" type="datetimeFigureOut">
               <a:rPr lang="en-US" smtClean="0"/>
-              <a:t>16-Aug-19</a:t>
+              <a:t>10/4/21</a:t>
             </a:fld>
             <a:endParaRPr lang="en-US"/>
           </a:p>
@@ -3614,23 +3614,11 @@
             <a:pPr algn="l"/>
             <a:r>
               <a:rPr lang="en-US" dirty="0"/>
-              <a:t>Enterprise </a:t>
-            </a:r>
-            <a:r>
-              <a:rPr lang="en-US" dirty="0" err="1"/>
-              <a:t>Programmering</a:t>
-            </a:r>
-            <a:r>
-              <a:rPr lang="en-US" dirty="0"/>
-              <a:t> 2</a:t>
+              <a:t>Enterprise Programming 2</a:t>
             </a:r>
             <a:br>
               <a:rPr lang="en-US" dirty="0"/>
             </a:br>
-            <a:r>
-              <a:rPr lang="en-US" dirty="0"/>
-              <a:t/>
-            </a:r>
             <a:br>
               <a:rPr lang="en-US" dirty="0"/>
             </a:br>
@@ -3666,11 +3654,11 @@
             <a:pPr algn="r"/>
             <a:r>
               <a:rPr lang="en-US" dirty="0"/>
-              <a:t>Prof. Andrea </a:t>
+              <a:t>Bogdan </a:t>
             </a:r>
             <a:r>
               <a:rPr lang="en-US" dirty="0" err="1"/>
-              <a:t>Arcuri</a:t>
+              <a:t>Marculescu</a:t>
             </a:r>
             <a:endParaRPr lang="en-US" dirty="0"/>
           </a:p>
@@ -3821,10 +3809,9 @@
           <a:lstStyle/>
           <a:p>
             <a:r>
-              <a:rPr lang="en-US" dirty="0" smtClean="0"/>
+              <a:rPr lang="en-US" dirty="0"/>
               <a:t>Automated Test Generation</a:t>
             </a:r>
-            <a:endParaRPr lang="en-US" dirty="0"/>
           </a:p>
         </p:txBody>
       </p:sp>
@@ -3880,10 +3867,9 @@
           <a:lstStyle/>
           <a:p>
             <a:r>
-              <a:rPr lang="en-US" dirty="0" smtClean="0"/>
+              <a:rPr lang="en-US" dirty="0"/>
               <a:t>Goals</a:t>
             </a:r>
-            <a:endParaRPr lang="en-US" dirty="0"/>
           </a:p>
         </p:txBody>
       </p:sp>
@@ -6144,7 +6130,7 @@
                 <a:cs typeface="Courier New" panose="02070309020205020404" pitchFamily="49" charset="0"/>
               </a:rPr>
             </a:br>
-            <a:r>
+            <a:br>
               <a:rPr kumimoji="0" lang="en-US" altLang="en-US" sz="1400" b="0" i="0" u="none" strike="noStrike" kern="1200" cap="none" spc="0" normalizeH="0" baseline="0" noProof="0" dirty="0">
                 <a:ln>
                   <a:noFill/>
@@ -6159,7 +6145,261 @@
                 <a:ea typeface="+mn-ea"/>
                 <a:cs typeface="Courier New" panose="02070309020205020404" pitchFamily="49" charset="0"/>
               </a:rPr>
-              <a:t/>
+            </a:br>
+            <a:r>
+              <a:rPr kumimoji="0" lang="en-US" altLang="en-US" sz="1400" b="0" i="0" u="none" strike="noStrike" kern="1200" cap="none" spc="0" normalizeH="0" baseline="0" noProof="0" dirty="0">
+                <a:ln>
+                  <a:noFill/>
+                </a:ln>
+                <a:solidFill>
+                  <a:srgbClr val="AEB5BD"/>
+                </a:solidFill>
+                <a:effectLst/>
+                <a:uLnTx/>
+                <a:uFillTx/>
+                <a:latin typeface="Courier New" panose="02070309020205020404" pitchFamily="49" charset="0"/>
+                <a:ea typeface="+mn-ea"/>
+                <a:cs typeface="Courier New" panose="02070309020205020404" pitchFamily="49" charset="0"/>
+              </a:rPr>
+              <a:t>    </a:t>
+            </a:r>
+            <a:r>
+              <a:rPr kumimoji="0" lang="en-US" altLang="en-US" sz="1400" b="0" i="0" u="none" strike="noStrike" kern="1200" cap="none" spc="0" normalizeH="0" baseline="0" noProof="0" dirty="0">
+                <a:ln>
+                  <a:noFill/>
+                </a:ln>
+                <a:solidFill>
+                  <a:srgbClr val="597CC2"/>
+                </a:solidFill>
+                <a:effectLst/>
+                <a:uLnTx/>
+                <a:uFillTx/>
+                <a:latin typeface="Courier New" panose="02070309020205020404" pitchFamily="49" charset="0"/>
+                <a:ea typeface="+mn-ea"/>
+                <a:cs typeface="Courier New" panose="02070309020205020404" pitchFamily="49" charset="0"/>
+              </a:rPr>
+              <a:t>if</a:t>
+            </a:r>
+            <a:r>
+              <a:rPr kumimoji="0" lang="en-US" altLang="en-US" sz="1400" b="0" i="0" u="none" strike="noStrike" kern="1200" cap="none" spc="0" normalizeH="0" baseline="0" noProof="0" dirty="0">
+                <a:ln>
+                  <a:noFill/>
+                </a:ln>
+                <a:solidFill>
+                  <a:srgbClr val="AEB5BD"/>
+                </a:solidFill>
+                <a:effectLst/>
+                <a:uLnTx/>
+                <a:uFillTx/>
+                <a:latin typeface="Courier New" panose="02070309020205020404" pitchFamily="49" charset="0"/>
+                <a:ea typeface="+mn-ea"/>
+                <a:cs typeface="Courier New" panose="02070309020205020404" pitchFamily="49" charset="0"/>
+              </a:rPr>
+              <a:t>(</a:t>
+            </a:r>
+            <a:r>
+              <a:rPr kumimoji="0" lang="en-US" altLang="en-US" sz="1400" b="0" i="0" u="none" strike="noStrike" kern="1200" cap="none" spc="0" normalizeH="0" baseline="0" noProof="0" dirty="0">
+                <a:ln>
+                  <a:noFill/>
+                </a:ln>
+                <a:solidFill>
+                  <a:srgbClr val="A9B7C6"/>
+                </a:solidFill>
+                <a:effectLst/>
+                <a:uLnTx/>
+                <a:uFillTx/>
+                <a:latin typeface="Courier New" panose="02070309020205020404" pitchFamily="49" charset="0"/>
+                <a:ea typeface="+mn-ea"/>
+                <a:cs typeface="Courier New" panose="02070309020205020404" pitchFamily="49" charset="0"/>
+              </a:rPr>
+              <a:t>a </a:t>
+            </a:r>
+            <a:r>
+              <a:rPr kumimoji="0" lang="en-US" altLang="en-US" sz="1400" b="0" i="0" u="none" strike="noStrike" kern="1200" cap="none" spc="0" normalizeH="0" baseline="0" noProof="0" dirty="0">
+                <a:ln>
+                  <a:noFill/>
+                </a:ln>
+                <a:solidFill>
+                  <a:srgbClr val="AEB5BD"/>
+                </a:solidFill>
+                <a:effectLst/>
+                <a:uLnTx/>
+                <a:uFillTx/>
+                <a:latin typeface="Courier New" panose="02070309020205020404" pitchFamily="49" charset="0"/>
+                <a:ea typeface="+mn-ea"/>
+                <a:cs typeface="Courier New" panose="02070309020205020404" pitchFamily="49" charset="0"/>
+              </a:rPr>
+              <a:t>&lt;=</a:t>
+            </a:r>
+            <a:r>
+              <a:rPr kumimoji="0" lang="en-US" altLang="en-US" sz="1400" b="0" i="0" u="none" strike="noStrike" kern="1200" cap="none" spc="0" normalizeH="0" baseline="0" noProof="0" dirty="0">
+                <a:ln>
+                  <a:noFill/>
+                </a:ln>
+                <a:solidFill>
+                  <a:srgbClr val="267DFF"/>
+                </a:solidFill>
+                <a:effectLst/>
+                <a:uLnTx/>
+                <a:uFillTx/>
+                <a:latin typeface="Courier New" panose="02070309020205020404" pitchFamily="49" charset="0"/>
+                <a:ea typeface="+mn-ea"/>
+                <a:cs typeface="Courier New" panose="02070309020205020404" pitchFamily="49" charset="0"/>
+              </a:rPr>
+              <a:t>0 </a:t>
+            </a:r>
+            <a:r>
+              <a:rPr kumimoji="0" lang="en-US" altLang="en-US" sz="1400" b="0" i="0" u="none" strike="noStrike" kern="1200" cap="none" spc="0" normalizeH="0" baseline="0" noProof="0" dirty="0">
+                <a:ln>
+                  <a:noFill/>
+                </a:ln>
+                <a:solidFill>
+                  <a:srgbClr val="AEB5BD"/>
+                </a:solidFill>
+                <a:effectLst/>
+                <a:uLnTx/>
+                <a:uFillTx/>
+                <a:latin typeface="Courier New" panose="02070309020205020404" pitchFamily="49" charset="0"/>
+                <a:ea typeface="+mn-ea"/>
+                <a:cs typeface="Courier New" panose="02070309020205020404" pitchFamily="49" charset="0"/>
+              </a:rPr>
+              <a:t>|| </a:t>
+            </a:r>
+            <a:r>
+              <a:rPr kumimoji="0" lang="en-US" altLang="en-US" sz="1400" b="0" i="0" u="none" strike="noStrike" kern="1200" cap="none" spc="0" normalizeH="0" baseline="0" noProof="0" dirty="0">
+                <a:ln>
+                  <a:noFill/>
+                </a:ln>
+                <a:solidFill>
+                  <a:srgbClr val="A9B7C6"/>
+                </a:solidFill>
+                <a:effectLst/>
+                <a:uLnTx/>
+                <a:uFillTx/>
+                <a:latin typeface="Courier New" panose="02070309020205020404" pitchFamily="49" charset="0"/>
+                <a:ea typeface="+mn-ea"/>
+                <a:cs typeface="Courier New" panose="02070309020205020404" pitchFamily="49" charset="0"/>
+              </a:rPr>
+              <a:t>b</a:t>
+            </a:r>
+            <a:r>
+              <a:rPr kumimoji="0" lang="en-US" altLang="en-US" sz="1400" b="0" i="0" u="none" strike="noStrike" kern="1200" cap="none" spc="0" normalizeH="0" baseline="0" noProof="0" dirty="0">
+                <a:ln>
+                  <a:noFill/>
+                </a:ln>
+                <a:solidFill>
+                  <a:srgbClr val="AEB5BD"/>
+                </a:solidFill>
+                <a:effectLst/>
+                <a:uLnTx/>
+                <a:uFillTx/>
+                <a:latin typeface="Courier New" panose="02070309020205020404" pitchFamily="49" charset="0"/>
+                <a:ea typeface="+mn-ea"/>
+                <a:cs typeface="Courier New" panose="02070309020205020404" pitchFamily="49" charset="0"/>
+              </a:rPr>
+              <a:t>&lt;= </a:t>
+            </a:r>
+            <a:r>
+              <a:rPr kumimoji="0" lang="en-US" altLang="en-US" sz="1400" b="0" i="0" u="none" strike="noStrike" kern="1200" cap="none" spc="0" normalizeH="0" baseline="0" noProof="0" dirty="0">
+                <a:ln>
+                  <a:noFill/>
+                </a:ln>
+                <a:solidFill>
+                  <a:srgbClr val="267DFF"/>
+                </a:solidFill>
+                <a:effectLst/>
+                <a:uLnTx/>
+                <a:uFillTx/>
+                <a:latin typeface="Courier New" panose="02070309020205020404" pitchFamily="49" charset="0"/>
+                <a:ea typeface="+mn-ea"/>
+                <a:cs typeface="Courier New" panose="02070309020205020404" pitchFamily="49" charset="0"/>
+              </a:rPr>
+              <a:t>0 </a:t>
+            </a:r>
+            <a:r>
+              <a:rPr kumimoji="0" lang="en-US" altLang="en-US" sz="1400" b="0" i="0" u="none" strike="noStrike" kern="1200" cap="none" spc="0" normalizeH="0" baseline="0" noProof="0" dirty="0">
+                <a:ln>
+                  <a:noFill/>
+                </a:ln>
+                <a:solidFill>
+                  <a:srgbClr val="AEB5BD"/>
+                </a:solidFill>
+                <a:effectLst/>
+                <a:uLnTx/>
+                <a:uFillTx/>
+                <a:latin typeface="Courier New" panose="02070309020205020404" pitchFamily="49" charset="0"/>
+                <a:ea typeface="+mn-ea"/>
+                <a:cs typeface="Courier New" panose="02070309020205020404" pitchFamily="49" charset="0"/>
+              </a:rPr>
+              <a:t>|| </a:t>
+            </a:r>
+            <a:r>
+              <a:rPr kumimoji="0" lang="en-US" altLang="en-US" sz="1400" b="0" i="0" u="none" strike="noStrike" kern="1200" cap="none" spc="0" normalizeH="0" baseline="0" noProof="0" dirty="0">
+                <a:ln>
+                  <a:noFill/>
+                </a:ln>
+                <a:solidFill>
+                  <a:srgbClr val="A9B7C6"/>
+                </a:solidFill>
+                <a:effectLst/>
+                <a:uLnTx/>
+                <a:uFillTx/>
+                <a:latin typeface="Courier New" panose="02070309020205020404" pitchFamily="49" charset="0"/>
+                <a:ea typeface="+mn-ea"/>
+                <a:cs typeface="Courier New" panose="02070309020205020404" pitchFamily="49" charset="0"/>
+              </a:rPr>
+              <a:t>c</a:t>
+            </a:r>
+            <a:r>
+              <a:rPr kumimoji="0" lang="en-US" altLang="en-US" sz="1400" b="0" i="0" u="none" strike="noStrike" kern="1200" cap="none" spc="0" normalizeH="0" baseline="0" noProof="0" dirty="0">
+                <a:ln>
+                  <a:noFill/>
+                </a:ln>
+                <a:solidFill>
+                  <a:srgbClr val="AEB5BD"/>
+                </a:solidFill>
+                <a:effectLst/>
+                <a:uLnTx/>
+                <a:uFillTx/>
+                <a:latin typeface="Courier New" panose="02070309020205020404" pitchFamily="49" charset="0"/>
+                <a:ea typeface="+mn-ea"/>
+                <a:cs typeface="Courier New" panose="02070309020205020404" pitchFamily="49" charset="0"/>
+              </a:rPr>
+              <a:t>&lt;= </a:t>
+            </a:r>
+            <a:r>
+              <a:rPr kumimoji="0" lang="en-US" altLang="en-US" sz="1400" b="0" i="0" u="none" strike="noStrike" kern="1200" cap="none" spc="0" normalizeH="0" baseline="0" noProof="0" dirty="0">
+                <a:ln>
+                  <a:noFill/>
+                </a:ln>
+                <a:solidFill>
+                  <a:srgbClr val="267DFF"/>
+                </a:solidFill>
+                <a:effectLst/>
+                <a:uLnTx/>
+                <a:uFillTx/>
+                <a:latin typeface="Courier New" panose="02070309020205020404" pitchFamily="49" charset="0"/>
+                <a:ea typeface="+mn-ea"/>
+                <a:cs typeface="Courier New" panose="02070309020205020404" pitchFamily="49" charset="0"/>
+              </a:rPr>
+              <a:t>0</a:t>
+            </a:r>
+            <a:r>
+              <a:rPr kumimoji="0" lang="en-US" altLang="en-US" sz="1400" b="0" i="0" u="none" strike="noStrike" kern="1200" cap="none" spc="0" normalizeH="0" baseline="0" noProof="0" dirty="0">
+                <a:ln>
+                  <a:noFill/>
+                </a:ln>
+                <a:solidFill>
+                  <a:srgbClr val="AEB5BD"/>
+                </a:solidFill>
+                <a:effectLst/>
+                <a:uLnTx/>
+                <a:uFillTx/>
+                <a:latin typeface="Courier New" panose="02070309020205020404" pitchFamily="49" charset="0"/>
+                <a:ea typeface="+mn-ea"/>
+                <a:cs typeface="Courier New" panose="02070309020205020404" pitchFamily="49" charset="0"/>
+              </a:rPr>
+              <a:t>){</a:t>
             </a:r>
             <a:br>
               <a:rPr kumimoji="0" lang="en-US" altLang="en-US" sz="1400" b="0" i="0" u="none" strike="noStrike" kern="1200" cap="none" spc="0" normalizeH="0" baseline="0" noProof="0" dirty="0">
@@ -6192,6 +6432,124 @@
                 <a:ea typeface="+mn-ea"/>
                 <a:cs typeface="Courier New" panose="02070309020205020404" pitchFamily="49" charset="0"/>
               </a:rPr>
+              <a:t>        </a:t>
+            </a:r>
+            <a:r>
+              <a:rPr kumimoji="0" lang="en-US" altLang="en-US" sz="1400" b="0" i="0" u="none" strike="noStrike" kern="1200" cap="none" spc="0" normalizeH="0" baseline="0" noProof="0" dirty="0">
+                <a:ln>
+                  <a:noFill/>
+                </a:ln>
+                <a:solidFill>
+                  <a:srgbClr val="597CC2"/>
+                </a:solidFill>
+                <a:effectLst/>
+                <a:uLnTx/>
+                <a:uFillTx/>
+                <a:latin typeface="Courier New" panose="02070309020205020404" pitchFamily="49" charset="0"/>
+                <a:ea typeface="+mn-ea"/>
+                <a:cs typeface="Courier New" panose="02070309020205020404" pitchFamily="49" charset="0"/>
+              </a:rPr>
+              <a:t>return </a:t>
+            </a:r>
+            <a:r>
+              <a:rPr kumimoji="0" lang="en-US" altLang="en-US" sz="1400" b="0" i="0" u="none" strike="noStrike" kern="1200" cap="none" spc="0" normalizeH="0" baseline="0" noProof="0" dirty="0" err="1">
+                <a:ln>
+                  <a:noFill/>
+                </a:ln>
+                <a:solidFill>
+                  <a:srgbClr val="A9B7C6"/>
+                </a:solidFill>
+                <a:effectLst/>
+                <a:uLnTx/>
+                <a:uFillTx/>
+                <a:latin typeface="Courier New" panose="02070309020205020404" pitchFamily="49" charset="0"/>
+                <a:ea typeface="+mn-ea"/>
+                <a:cs typeface="Courier New" panose="02070309020205020404" pitchFamily="49" charset="0"/>
+              </a:rPr>
+              <a:t>Classification</a:t>
+            </a:r>
+            <a:r>
+              <a:rPr kumimoji="0" lang="en-US" altLang="en-US" sz="1400" b="0" i="0" u="none" strike="noStrike" kern="1200" cap="none" spc="0" normalizeH="0" baseline="0" noProof="0" dirty="0" err="1">
+                <a:ln>
+                  <a:noFill/>
+                </a:ln>
+                <a:solidFill>
+                  <a:srgbClr val="AEB5BD"/>
+                </a:solidFill>
+                <a:effectLst/>
+                <a:uLnTx/>
+                <a:uFillTx/>
+                <a:latin typeface="Courier New" panose="02070309020205020404" pitchFamily="49" charset="0"/>
+                <a:ea typeface="+mn-ea"/>
+                <a:cs typeface="Courier New" panose="02070309020205020404" pitchFamily="49" charset="0"/>
+              </a:rPr>
+              <a:t>.</a:t>
+            </a:r>
+            <a:r>
+              <a:rPr kumimoji="0" lang="en-US" altLang="en-US" sz="1400" b="0" i="1" u="none" strike="noStrike" kern="1200" cap="none" spc="0" normalizeH="0" baseline="0" noProof="0" dirty="0" err="1">
+                <a:ln>
+                  <a:noFill/>
+                </a:ln>
+                <a:solidFill>
+                  <a:srgbClr val="828EBA"/>
+                </a:solidFill>
+                <a:effectLst/>
+                <a:uLnTx/>
+                <a:uFillTx/>
+                <a:latin typeface="Courier New" panose="02070309020205020404" pitchFamily="49" charset="0"/>
+                <a:ea typeface="+mn-ea"/>
+                <a:cs typeface="Courier New" panose="02070309020205020404" pitchFamily="49" charset="0"/>
+              </a:rPr>
+              <a:t>NOT_A_TRIANGLE</a:t>
+            </a:r>
+            <a:r>
+              <a:rPr kumimoji="0" lang="en-US" altLang="en-US" sz="1400" b="0" i="0" u="none" strike="noStrike" kern="1200" cap="none" spc="0" normalizeH="0" baseline="0" noProof="0" dirty="0">
+                <a:ln>
+                  <a:noFill/>
+                </a:ln>
+                <a:solidFill>
+                  <a:srgbClr val="597CC2"/>
+                </a:solidFill>
+                <a:effectLst/>
+                <a:uLnTx/>
+                <a:uFillTx/>
+                <a:latin typeface="Courier New" panose="02070309020205020404" pitchFamily="49" charset="0"/>
+                <a:ea typeface="+mn-ea"/>
+                <a:cs typeface="Courier New" panose="02070309020205020404" pitchFamily="49" charset="0"/>
+              </a:rPr>
+              <a:t>;</a:t>
+            </a:r>
+            <a:br>
+              <a:rPr kumimoji="0" lang="en-US" altLang="en-US" sz="1400" b="0" i="0" u="none" strike="noStrike" kern="1200" cap="none" spc="0" normalizeH="0" baseline="0" noProof="0" dirty="0">
+                <a:ln>
+                  <a:noFill/>
+                </a:ln>
+                <a:solidFill>
+                  <a:srgbClr val="597CC2"/>
+                </a:solidFill>
+                <a:effectLst/>
+                <a:uLnTx/>
+                <a:uFillTx/>
+                <a:latin typeface="Courier New" panose="02070309020205020404" pitchFamily="49" charset="0"/>
+                <a:ea typeface="+mn-ea"/>
+                <a:cs typeface="Courier New" panose="02070309020205020404" pitchFamily="49" charset="0"/>
+              </a:rPr>
+            </a:br>
+            <a:r>
+              <a:rPr kumimoji="0" lang="en-US" altLang="en-US" sz="1400" b="0" i="0" u="none" strike="noStrike" kern="1200" cap="none" spc="0" normalizeH="0" baseline="0" noProof="0" dirty="0">
+                <a:ln>
+                  <a:noFill/>
+                </a:ln>
+                <a:solidFill>
+                  <a:srgbClr val="597CC2"/>
+                </a:solidFill>
+                <a:effectLst/>
+                <a:uLnTx/>
+                <a:uFillTx/>
+                <a:latin typeface="Courier New" panose="02070309020205020404" pitchFamily="49" charset="0"/>
+                <a:ea typeface="+mn-ea"/>
+                <a:cs typeface="Courier New" panose="02070309020205020404" pitchFamily="49" charset="0"/>
+              </a:rPr>
               <a:t>    </a:t>
             </a:r>
             <a:r>
@@ -6200,6 +6558,72 @@
                   <a:noFill/>
                 </a:ln>
                 <a:solidFill>
+                  <a:srgbClr val="AEB5BD"/>
+                </a:solidFill>
+                <a:effectLst/>
+                <a:uLnTx/>
+                <a:uFillTx/>
+                <a:latin typeface="Courier New" panose="02070309020205020404" pitchFamily="49" charset="0"/>
+                <a:ea typeface="+mn-ea"/>
+                <a:cs typeface="Courier New" panose="02070309020205020404" pitchFamily="49" charset="0"/>
+              </a:rPr>
+              <a:t>}</a:t>
+            </a:r>
+            <a:br>
+              <a:rPr kumimoji="0" lang="en-US" altLang="en-US" sz="1400" b="0" i="0" u="none" strike="noStrike" kern="1200" cap="none" spc="0" normalizeH="0" baseline="0" noProof="0" dirty="0">
+                <a:ln>
+                  <a:noFill/>
+                </a:ln>
+                <a:solidFill>
+                  <a:srgbClr val="AEB5BD"/>
+                </a:solidFill>
+                <a:effectLst/>
+                <a:uLnTx/>
+                <a:uFillTx/>
+                <a:latin typeface="Courier New" panose="02070309020205020404" pitchFamily="49" charset="0"/>
+                <a:ea typeface="+mn-ea"/>
+                <a:cs typeface="Courier New" panose="02070309020205020404" pitchFamily="49" charset="0"/>
+              </a:rPr>
+            </a:br>
+            <a:br>
+              <a:rPr kumimoji="0" lang="en-US" altLang="en-US" sz="1400" b="0" i="0" u="none" strike="noStrike" kern="1200" cap="none" spc="0" normalizeH="0" baseline="0" noProof="0" dirty="0">
+                <a:ln>
+                  <a:noFill/>
+                </a:ln>
+                <a:solidFill>
+                  <a:srgbClr val="AEB5BD"/>
+                </a:solidFill>
+                <a:effectLst/>
+                <a:uLnTx/>
+                <a:uFillTx/>
+                <a:latin typeface="Courier New" panose="02070309020205020404" pitchFamily="49" charset="0"/>
+                <a:ea typeface="+mn-ea"/>
+                <a:cs typeface="Courier New" panose="02070309020205020404" pitchFamily="49" charset="0"/>
+              </a:rPr>
+            </a:br>
+            <a:r>
+              <a:rPr kumimoji="0" lang="en-US" altLang="en-US" sz="1400" b="0" i="0" u="none" strike="noStrike" kern="1200" cap="none" spc="0" normalizeH="0" baseline="0" noProof="0" dirty="0">
+                <a:ln>
+                  <a:noFill/>
+                </a:ln>
+                <a:solidFill>
+                  <a:srgbClr val="AEB5BD"/>
+                </a:solidFill>
+                <a:effectLst/>
+                <a:uLnTx/>
+                <a:uFillTx/>
+                <a:latin typeface="Courier New" panose="02070309020205020404" pitchFamily="49" charset="0"/>
+                <a:ea typeface="+mn-ea"/>
+                <a:cs typeface="Courier New" panose="02070309020205020404" pitchFamily="49" charset="0"/>
+              </a:rPr>
+              <a:t>    </a:t>
+            </a:r>
+            <a:r>
+              <a:rPr kumimoji="0" lang="en-US" altLang="en-US" sz="1400" b="0" i="0" u="none" strike="noStrike" kern="1200" cap="none" spc="0" normalizeH="0" baseline="0" noProof="0" dirty="0">
+                <a:ln>
+                  <a:noFill/>
+                </a:ln>
+                <a:solidFill>
                   <a:srgbClr val="597CC2"/>
                 </a:solidFill>
                 <a:effectLst/>
@@ -6243,6 +6667,782 @@
                 <a:ea typeface="+mn-ea"/>
                 <a:cs typeface="Courier New" panose="02070309020205020404" pitchFamily="49" charset="0"/>
               </a:rPr>
+              <a:t>a</a:t>
+            </a:r>
+            <a:r>
+              <a:rPr kumimoji="0" lang="en-US" altLang="en-US" sz="1400" b="0" i="0" u="none" strike="noStrike" kern="1200" cap="none" spc="0" normalizeH="0" baseline="0" noProof="0" dirty="0">
+                <a:ln>
+                  <a:noFill/>
+                </a:ln>
+                <a:solidFill>
+                  <a:srgbClr val="AEB5BD"/>
+                </a:solidFill>
+                <a:effectLst/>
+                <a:uLnTx/>
+                <a:uFillTx/>
+                <a:latin typeface="Courier New" panose="02070309020205020404" pitchFamily="49" charset="0"/>
+                <a:ea typeface="+mn-ea"/>
+                <a:cs typeface="Courier New" panose="02070309020205020404" pitchFamily="49" charset="0"/>
+              </a:rPr>
+              <a:t>==</a:t>
+            </a:r>
+            <a:r>
+              <a:rPr kumimoji="0" lang="en-US" altLang="en-US" sz="1400" b="0" i="0" u="none" strike="noStrike" kern="1200" cap="none" spc="0" normalizeH="0" baseline="0" noProof="0" dirty="0">
+                <a:ln>
+                  <a:noFill/>
+                </a:ln>
+                <a:solidFill>
+                  <a:srgbClr val="A9B7C6"/>
+                </a:solidFill>
+                <a:effectLst/>
+                <a:uLnTx/>
+                <a:uFillTx/>
+                <a:latin typeface="Courier New" panose="02070309020205020404" pitchFamily="49" charset="0"/>
+                <a:ea typeface="+mn-ea"/>
+                <a:cs typeface="Courier New" panose="02070309020205020404" pitchFamily="49" charset="0"/>
+              </a:rPr>
+              <a:t>b </a:t>
+            </a:r>
+            <a:r>
+              <a:rPr kumimoji="0" lang="en-US" altLang="en-US" sz="1400" b="0" i="0" u="none" strike="noStrike" kern="1200" cap="none" spc="0" normalizeH="0" baseline="0" noProof="0" dirty="0">
+                <a:ln>
+                  <a:noFill/>
+                </a:ln>
+                <a:solidFill>
+                  <a:srgbClr val="AEB5BD"/>
+                </a:solidFill>
+                <a:effectLst/>
+                <a:uLnTx/>
+                <a:uFillTx/>
+                <a:latin typeface="Courier New" panose="02070309020205020404" pitchFamily="49" charset="0"/>
+                <a:ea typeface="+mn-ea"/>
+                <a:cs typeface="Courier New" panose="02070309020205020404" pitchFamily="49" charset="0"/>
+              </a:rPr>
+              <a:t>&amp;&amp; </a:t>
+            </a:r>
+            <a:r>
+              <a:rPr kumimoji="0" lang="en-US" altLang="en-US" sz="1400" b="0" i="0" u="none" strike="noStrike" kern="1200" cap="none" spc="0" normalizeH="0" baseline="0" noProof="0" dirty="0">
+                <a:ln>
+                  <a:noFill/>
+                </a:ln>
+                <a:solidFill>
+                  <a:srgbClr val="A9B7C6"/>
+                </a:solidFill>
+                <a:effectLst/>
+                <a:uLnTx/>
+                <a:uFillTx/>
+                <a:latin typeface="Courier New" panose="02070309020205020404" pitchFamily="49" charset="0"/>
+                <a:ea typeface="+mn-ea"/>
+                <a:cs typeface="Courier New" panose="02070309020205020404" pitchFamily="49" charset="0"/>
+              </a:rPr>
+              <a:t>b</a:t>
+            </a:r>
+            <a:r>
+              <a:rPr kumimoji="0" lang="en-US" altLang="en-US" sz="1400" b="0" i="0" u="none" strike="noStrike" kern="1200" cap="none" spc="0" normalizeH="0" baseline="0" noProof="0" dirty="0">
+                <a:ln>
+                  <a:noFill/>
+                </a:ln>
+                <a:solidFill>
+                  <a:srgbClr val="AEB5BD"/>
+                </a:solidFill>
+                <a:effectLst/>
+                <a:uLnTx/>
+                <a:uFillTx/>
+                <a:latin typeface="Courier New" panose="02070309020205020404" pitchFamily="49" charset="0"/>
+                <a:ea typeface="+mn-ea"/>
+                <a:cs typeface="Courier New" panose="02070309020205020404" pitchFamily="49" charset="0"/>
+              </a:rPr>
+              <a:t>==</a:t>
+            </a:r>
+            <a:r>
+              <a:rPr kumimoji="0" lang="en-US" altLang="en-US" sz="1400" b="0" i="0" u="none" strike="noStrike" kern="1200" cap="none" spc="0" normalizeH="0" baseline="0" noProof="0" dirty="0">
+                <a:ln>
+                  <a:noFill/>
+                </a:ln>
+                <a:solidFill>
+                  <a:srgbClr val="A9B7C6"/>
+                </a:solidFill>
+                <a:effectLst/>
+                <a:uLnTx/>
+                <a:uFillTx/>
+                <a:latin typeface="Courier New" panose="02070309020205020404" pitchFamily="49" charset="0"/>
+                <a:ea typeface="+mn-ea"/>
+                <a:cs typeface="Courier New" panose="02070309020205020404" pitchFamily="49" charset="0"/>
+              </a:rPr>
+              <a:t>c</a:t>
+            </a:r>
+            <a:r>
+              <a:rPr kumimoji="0" lang="en-US" altLang="en-US" sz="1400" b="0" i="0" u="none" strike="noStrike" kern="1200" cap="none" spc="0" normalizeH="0" baseline="0" noProof="0" dirty="0">
+                <a:ln>
+                  <a:noFill/>
+                </a:ln>
+                <a:solidFill>
+                  <a:srgbClr val="AEB5BD"/>
+                </a:solidFill>
+                <a:effectLst/>
+                <a:uLnTx/>
+                <a:uFillTx/>
+                <a:latin typeface="Courier New" panose="02070309020205020404" pitchFamily="49" charset="0"/>
+                <a:ea typeface="+mn-ea"/>
+                <a:cs typeface="Courier New" panose="02070309020205020404" pitchFamily="49" charset="0"/>
+              </a:rPr>
+              <a:t>){</a:t>
+            </a:r>
+            <a:br>
+              <a:rPr kumimoji="0" lang="en-US" altLang="en-US" sz="1400" b="0" i="0" u="none" strike="noStrike" kern="1200" cap="none" spc="0" normalizeH="0" baseline="0" noProof="0" dirty="0">
+                <a:ln>
+                  <a:noFill/>
+                </a:ln>
+                <a:solidFill>
+                  <a:srgbClr val="AEB5BD"/>
+                </a:solidFill>
+                <a:effectLst/>
+                <a:uLnTx/>
+                <a:uFillTx/>
+                <a:latin typeface="Courier New" panose="02070309020205020404" pitchFamily="49" charset="0"/>
+                <a:ea typeface="+mn-ea"/>
+                <a:cs typeface="Courier New" panose="02070309020205020404" pitchFamily="49" charset="0"/>
+              </a:rPr>
+            </a:br>
+            <a:r>
+              <a:rPr kumimoji="0" lang="en-US" altLang="en-US" sz="1400" b="0" i="0" u="none" strike="noStrike" kern="1200" cap="none" spc="0" normalizeH="0" baseline="0" noProof="0" dirty="0">
+                <a:ln>
+                  <a:noFill/>
+                </a:ln>
+                <a:solidFill>
+                  <a:srgbClr val="AEB5BD"/>
+                </a:solidFill>
+                <a:effectLst/>
+                <a:uLnTx/>
+                <a:uFillTx/>
+                <a:latin typeface="Courier New" panose="02070309020205020404" pitchFamily="49" charset="0"/>
+                <a:ea typeface="+mn-ea"/>
+                <a:cs typeface="Courier New" panose="02070309020205020404" pitchFamily="49" charset="0"/>
+              </a:rPr>
+              <a:t>        </a:t>
+            </a:r>
+            <a:r>
+              <a:rPr kumimoji="0" lang="en-US" altLang="en-US" sz="1400" b="0" i="0" u="none" strike="noStrike" kern="1200" cap="none" spc="0" normalizeH="0" baseline="0" noProof="0" dirty="0">
+                <a:ln>
+                  <a:noFill/>
+                </a:ln>
+                <a:solidFill>
+                  <a:srgbClr val="597CC2"/>
+                </a:solidFill>
+                <a:effectLst/>
+                <a:uLnTx/>
+                <a:uFillTx/>
+                <a:latin typeface="Courier New" panose="02070309020205020404" pitchFamily="49" charset="0"/>
+                <a:ea typeface="+mn-ea"/>
+                <a:cs typeface="Courier New" panose="02070309020205020404" pitchFamily="49" charset="0"/>
+              </a:rPr>
+              <a:t>return </a:t>
+            </a:r>
+            <a:r>
+              <a:rPr kumimoji="0" lang="en-US" altLang="en-US" sz="1400" b="0" i="0" u="none" strike="noStrike" kern="1200" cap="none" spc="0" normalizeH="0" baseline="0" noProof="0" dirty="0" err="1">
+                <a:ln>
+                  <a:noFill/>
+                </a:ln>
+                <a:solidFill>
+                  <a:srgbClr val="A9B7C6"/>
+                </a:solidFill>
+                <a:effectLst/>
+                <a:uLnTx/>
+                <a:uFillTx/>
+                <a:latin typeface="Courier New" panose="02070309020205020404" pitchFamily="49" charset="0"/>
+                <a:ea typeface="+mn-ea"/>
+                <a:cs typeface="Courier New" panose="02070309020205020404" pitchFamily="49" charset="0"/>
+              </a:rPr>
+              <a:t>Classification</a:t>
+            </a:r>
+            <a:r>
+              <a:rPr kumimoji="0" lang="en-US" altLang="en-US" sz="1400" b="0" i="0" u="none" strike="noStrike" kern="1200" cap="none" spc="0" normalizeH="0" baseline="0" noProof="0" dirty="0" err="1">
+                <a:ln>
+                  <a:noFill/>
+                </a:ln>
+                <a:solidFill>
+                  <a:srgbClr val="AEB5BD"/>
+                </a:solidFill>
+                <a:effectLst/>
+                <a:uLnTx/>
+                <a:uFillTx/>
+                <a:latin typeface="Courier New" panose="02070309020205020404" pitchFamily="49" charset="0"/>
+                <a:ea typeface="+mn-ea"/>
+                <a:cs typeface="Courier New" panose="02070309020205020404" pitchFamily="49" charset="0"/>
+              </a:rPr>
+              <a:t>.</a:t>
+            </a:r>
+            <a:r>
+              <a:rPr kumimoji="0" lang="en-US" altLang="en-US" sz="1400" b="0" i="1" u="none" strike="noStrike" kern="1200" cap="none" spc="0" normalizeH="0" baseline="0" noProof="0" dirty="0" err="1">
+                <a:ln>
+                  <a:noFill/>
+                </a:ln>
+                <a:solidFill>
+                  <a:srgbClr val="828EBA"/>
+                </a:solidFill>
+                <a:effectLst/>
+                <a:uLnTx/>
+                <a:uFillTx/>
+                <a:latin typeface="Courier New" panose="02070309020205020404" pitchFamily="49" charset="0"/>
+                <a:ea typeface="+mn-ea"/>
+                <a:cs typeface="Courier New" panose="02070309020205020404" pitchFamily="49" charset="0"/>
+              </a:rPr>
+              <a:t>EQUILATERAL</a:t>
+            </a:r>
+            <a:r>
+              <a:rPr kumimoji="0" lang="en-US" altLang="en-US" sz="1400" b="0" i="0" u="none" strike="noStrike" kern="1200" cap="none" spc="0" normalizeH="0" baseline="0" noProof="0" dirty="0">
+                <a:ln>
+                  <a:noFill/>
+                </a:ln>
+                <a:solidFill>
+                  <a:srgbClr val="597CC2"/>
+                </a:solidFill>
+                <a:effectLst/>
+                <a:uLnTx/>
+                <a:uFillTx/>
+                <a:latin typeface="Courier New" panose="02070309020205020404" pitchFamily="49" charset="0"/>
+                <a:ea typeface="+mn-ea"/>
+                <a:cs typeface="Courier New" panose="02070309020205020404" pitchFamily="49" charset="0"/>
+              </a:rPr>
+              <a:t>;</a:t>
+            </a:r>
+            <a:br>
+              <a:rPr kumimoji="0" lang="en-US" altLang="en-US" sz="1400" b="0" i="0" u="none" strike="noStrike" kern="1200" cap="none" spc="0" normalizeH="0" baseline="0" noProof="0" dirty="0">
+                <a:ln>
+                  <a:noFill/>
+                </a:ln>
+                <a:solidFill>
+                  <a:srgbClr val="597CC2"/>
+                </a:solidFill>
+                <a:effectLst/>
+                <a:uLnTx/>
+                <a:uFillTx/>
+                <a:latin typeface="Courier New" panose="02070309020205020404" pitchFamily="49" charset="0"/>
+                <a:ea typeface="+mn-ea"/>
+                <a:cs typeface="Courier New" panose="02070309020205020404" pitchFamily="49" charset="0"/>
+              </a:rPr>
+            </a:br>
+            <a:r>
+              <a:rPr kumimoji="0" lang="en-US" altLang="en-US" sz="1400" b="0" i="0" u="none" strike="noStrike" kern="1200" cap="none" spc="0" normalizeH="0" baseline="0" noProof="0" dirty="0">
+                <a:ln>
+                  <a:noFill/>
+                </a:ln>
+                <a:solidFill>
+                  <a:srgbClr val="597CC2"/>
+                </a:solidFill>
+                <a:effectLst/>
+                <a:uLnTx/>
+                <a:uFillTx/>
+                <a:latin typeface="Courier New" panose="02070309020205020404" pitchFamily="49" charset="0"/>
+                <a:ea typeface="+mn-ea"/>
+                <a:cs typeface="Courier New" panose="02070309020205020404" pitchFamily="49" charset="0"/>
+              </a:rPr>
+              <a:t>    </a:t>
+            </a:r>
+            <a:r>
+              <a:rPr kumimoji="0" lang="en-US" altLang="en-US" sz="1400" b="0" i="0" u="none" strike="noStrike" kern="1200" cap="none" spc="0" normalizeH="0" baseline="0" noProof="0" dirty="0">
+                <a:ln>
+                  <a:noFill/>
+                </a:ln>
+                <a:solidFill>
+                  <a:srgbClr val="AEB5BD"/>
+                </a:solidFill>
+                <a:effectLst/>
+                <a:uLnTx/>
+                <a:uFillTx/>
+                <a:latin typeface="Courier New" panose="02070309020205020404" pitchFamily="49" charset="0"/>
+                <a:ea typeface="+mn-ea"/>
+                <a:cs typeface="Courier New" panose="02070309020205020404" pitchFamily="49" charset="0"/>
+              </a:rPr>
+              <a:t>}</a:t>
+            </a:r>
+            <a:br>
+              <a:rPr kumimoji="0" lang="en-US" altLang="en-US" sz="1400" b="0" i="0" u="none" strike="noStrike" kern="1200" cap="none" spc="0" normalizeH="0" baseline="0" noProof="0" dirty="0">
+                <a:ln>
+                  <a:noFill/>
+                </a:ln>
+                <a:solidFill>
+                  <a:srgbClr val="AEB5BD"/>
+                </a:solidFill>
+                <a:effectLst/>
+                <a:uLnTx/>
+                <a:uFillTx/>
+                <a:latin typeface="Courier New" panose="02070309020205020404" pitchFamily="49" charset="0"/>
+                <a:ea typeface="+mn-ea"/>
+                <a:cs typeface="Courier New" panose="02070309020205020404" pitchFamily="49" charset="0"/>
+              </a:rPr>
+            </a:br>
+            <a:br>
+              <a:rPr kumimoji="0" lang="en-US" altLang="en-US" sz="1400" b="0" i="0" u="none" strike="noStrike" kern="1200" cap="none" spc="0" normalizeH="0" baseline="0" noProof="0" dirty="0">
+                <a:ln>
+                  <a:noFill/>
+                </a:ln>
+                <a:solidFill>
+                  <a:srgbClr val="AEB5BD"/>
+                </a:solidFill>
+                <a:effectLst/>
+                <a:uLnTx/>
+                <a:uFillTx/>
+                <a:latin typeface="Courier New" panose="02070309020205020404" pitchFamily="49" charset="0"/>
+                <a:ea typeface="+mn-ea"/>
+                <a:cs typeface="Courier New" panose="02070309020205020404" pitchFamily="49" charset="0"/>
+              </a:rPr>
+            </a:br>
+            <a:r>
+              <a:rPr kumimoji="0" lang="en-US" altLang="en-US" sz="1400" b="0" i="0" u="none" strike="noStrike" kern="1200" cap="none" spc="0" normalizeH="0" baseline="0" noProof="0" dirty="0">
+                <a:ln>
+                  <a:noFill/>
+                </a:ln>
+                <a:solidFill>
+                  <a:srgbClr val="AEB5BD"/>
+                </a:solidFill>
+                <a:effectLst/>
+                <a:uLnTx/>
+                <a:uFillTx/>
+                <a:latin typeface="Courier New" panose="02070309020205020404" pitchFamily="49" charset="0"/>
+                <a:ea typeface="+mn-ea"/>
+                <a:cs typeface="Courier New" panose="02070309020205020404" pitchFamily="49" charset="0"/>
+              </a:rPr>
+              <a:t>    </a:t>
+            </a:r>
+            <a:r>
+              <a:rPr kumimoji="0" lang="en-US" altLang="en-US" sz="1400" b="0" i="0" u="none" strike="noStrike" kern="1200" cap="none" spc="0" normalizeH="0" baseline="0" noProof="0" dirty="0" err="1">
+                <a:ln>
+                  <a:noFill/>
+                </a:ln>
+                <a:solidFill>
+                  <a:srgbClr val="597CC2"/>
+                </a:solidFill>
+                <a:effectLst/>
+                <a:uLnTx/>
+                <a:uFillTx/>
+                <a:latin typeface="Courier New" panose="02070309020205020404" pitchFamily="49" charset="0"/>
+                <a:ea typeface="+mn-ea"/>
+                <a:cs typeface="Courier New" panose="02070309020205020404" pitchFamily="49" charset="0"/>
+              </a:rPr>
+              <a:t>int</a:t>
+            </a:r>
+            <a:r>
+              <a:rPr kumimoji="0" lang="en-US" altLang="en-US" sz="1400" b="0" i="0" u="none" strike="noStrike" kern="1200" cap="none" spc="0" normalizeH="0" baseline="0" noProof="0" dirty="0">
+                <a:ln>
+                  <a:noFill/>
+                </a:ln>
+                <a:solidFill>
+                  <a:srgbClr val="597CC2"/>
+                </a:solidFill>
+                <a:effectLst/>
+                <a:uLnTx/>
+                <a:uFillTx/>
+                <a:latin typeface="Courier New" panose="02070309020205020404" pitchFamily="49" charset="0"/>
+                <a:ea typeface="+mn-ea"/>
+                <a:cs typeface="Courier New" panose="02070309020205020404" pitchFamily="49" charset="0"/>
+              </a:rPr>
+              <a:t> </a:t>
+            </a:r>
+            <a:r>
+              <a:rPr kumimoji="0" lang="en-US" altLang="en-US" sz="1400" b="0" i="0" u="none" strike="noStrike" kern="1200" cap="none" spc="0" normalizeH="0" baseline="0" noProof="0" dirty="0">
+                <a:ln>
+                  <a:noFill/>
+                </a:ln>
+                <a:solidFill>
+                  <a:srgbClr val="A9B7C6"/>
+                </a:solidFill>
+                <a:effectLst/>
+                <a:uLnTx/>
+                <a:uFillTx/>
+                <a:latin typeface="Courier New" panose="02070309020205020404" pitchFamily="49" charset="0"/>
+                <a:ea typeface="+mn-ea"/>
+                <a:cs typeface="Courier New" panose="02070309020205020404" pitchFamily="49" charset="0"/>
+              </a:rPr>
+              <a:t>max </a:t>
+            </a:r>
+            <a:r>
+              <a:rPr kumimoji="0" lang="en-US" altLang="en-US" sz="1400" b="0" i="0" u="none" strike="noStrike" kern="1200" cap="none" spc="0" normalizeH="0" baseline="0" noProof="0" dirty="0">
+                <a:ln>
+                  <a:noFill/>
+                </a:ln>
+                <a:solidFill>
+                  <a:srgbClr val="AEB5BD"/>
+                </a:solidFill>
+                <a:effectLst/>
+                <a:uLnTx/>
+                <a:uFillTx/>
+                <a:latin typeface="Courier New" panose="02070309020205020404" pitchFamily="49" charset="0"/>
+                <a:ea typeface="+mn-ea"/>
+                <a:cs typeface="Courier New" panose="02070309020205020404" pitchFamily="49" charset="0"/>
+              </a:rPr>
+              <a:t>= </a:t>
+            </a:r>
+            <a:r>
+              <a:rPr kumimoji="0" lang="en-US" altLang="en-US" sz="1400" b="0" i="0" u="none" strike="noStrike" kern="1200" cap="none" spc="0" normalizeH="0" baseline="0" noProof="0" dirty="0" err="1">
+                <a:ln>
+                  <a:noFill/>
+                </a:ln>
+                <a:solidFill>
+                  <a:srgbClr val="A9B7C6"/>
+                </a:solidFill>
+                <a:effectLst/>
+                <a:uLnTx/>
+                <a:uFillTx/>
+                <a:latin typeface="Courier New" panose="02070309020205020404" pitchFamily="49" charset="0"/>
+                <a:ea typeface="+mn-ea"/>
+                <a:cs typeface="Courier New" panose="02070309020205020404" pitchFamily="49" charset="0"/>
+              </a:rPr>
+              <a:t>Math</a:t>
+            </a:r>
+            <a:r>
+              <a:rPr kumimoji="0" lang="en-US" altLang="en-US" sz="1400" b="0" i="0" u="none" strike="noStrike" kern="1200" cap="none" spc="0" normalizeH="0" baseline="0" noProof="0" dirty="0" err="1">
+                <a:ln>
+                  <a:noFill/>
+                </a:ln>
+                <a:solidFill>
+                  <a:srgbClr val="AEB5BD"/>
+                </a:solidFill>
+                <a:effectLst/>
+                <a:uLnTx/>
+                <a:uFillTx/>
+                <a:latin typeface="Courier New" panose="02070309020205020404" pitchFamily="49" charset="0"/>
+                <a:ea typeface="+mn-ea"/>
+                <a:cs typeface="Courier New" panose="02070309020205020404" pitchFamily="49" charset="0"/>
+              </a:rPr>
+              <a:t>.</a:t>
+            </a:r>
+            <a:r>
+              <a:rPr kumimoji="0" lang="en-US" altLang="en-US" sz="1400" b="0" i="1" u="none" strike="noStrike" kern="1200" cap="none" spc="0" normalizeH="0" baseline="0" noProof="0" dirty="0" err="1">
+                <a:ln>
+                  <a:noFill/>
+                </a:ln>
+                <a:solidFill>
+                  <a:srgbClr val="AEB5BD"/>
+                </a:solidFill>
+                <a:effectLst/>
+                <a:uLnTx/>
+                <a:uFillTx/>
+                <a:latin typeface="Courier New" panose="02070309020205020404" pitchFamily="49" charset="0"/>
+                <a:ea typeface="+mn-ea"/>
+                <a:cs typeface="Courier New" panose="02070309020205020404" pitchFamily="49" charset="0"/>
+              </a:rPr>
+              <a:t>max</a:t>
+            </a:r>
+            <a:r>
+              <a:rPr kumimoji="0" lang="en-US" altLang="en-US" sz="1400" b="0" i="0" u="none" strike="noStrike" kern="1200" cap="none" spc="0" normalizeH="0" baseline="0" noProof="0" dirty="0">
+                <a:ln>
+                  <a:noFill/>
+                </a:ln>
+                <a:solidFill>
+                  <a:srgbClr val="AEB5BD"/>
+                </a:solidFill>
+                <a:effectLst/>
+                <a:uLnTx/>
+                <a:uFillTx/>
+                <a:latin typeface="Courier New" panose="02070309020205020404" pitchFamily="49" charset="0"/>
+                <a:ea typeface="+mn-ea"/>
+                <a:cs typeface="Courier New" panose="02070309020205020404" pitchFamily="49" charset="0"/>
+              </a:rPr>
+              <a:t>(</a:t>
+            </a:r>
+            <a:r>
+              <a:rPr kumimoji="0" lang="en-US" altLang="en-US" sz="1400" b="0" i="0" u="none" strike="noStrike" kern="1200" cap="none" spc="0" normalizeH="0" baseline="0" noProof="0" dirty="0">
+                <a:ln>
+                  <a:noFill/>
+                </a:ln>
+                <a:solidFill>
+                  <a:srgbClr val="A9B7C6"/>
+                </a:solidFill>
+                <a:effectLst/>
+                <a:uLnTx/>
+                <a:uFillTx/>
+                <a:latin typeface="Courier New" panose="02070309020205020404" pitchFamily="49" charset="0"/>
+                <a:ea typeface="+mn-ea"/>
+                <a:cs typeface="Courier New" panose="02070309020205020404" pitchFamily="49" charset="0"/>
+              </a:rPr>
+              <a:t>a</a:t>
+            </a:r>
+            <a:r>
+              <a:rPr kumimoji="0" lang="en-US" altLang="en-US" sz="1400" b="0" i="0" u="none" strike="noStrike" kern="1200" cap="none" spc="0" normalizeH="0" baseline="0" noProof="0" dirty="0">
+                <a:ln>
+                  <a:noFill/>
+                </a:ln>
+                <a:solidFill>
+                  <a:srgbClr val="5C7AB8"/>
+                </a:solidFill>
+                <a:effectLst/>
+                <a:uLnTx/>
+                <a:uFillTx/>
+                <a:latin typeface="Courier New" panose="02070309020205020404" pitchFamily="49" charset="0"/>
+                <a:ea typeface="+mn-ea"/>
+                <a:cs typeface="Courier New" panose="02070309020205020404" pitchFamily="49" charset="0"/>
+              </a:rPr>
+              <a:t>, </a:t>
+            </a:r>
+            <a:r>
+              <a:rPr kumimoji="0" lang="en-US" altLang="en-US" sz="1400" b="0" i="0" u="none" strike="noStrike" kern="1200" cap="none" spc="0" normalizeH="0" baseline="0" noProof="0" dirty="0" err="1">
+                <a:ln>
+                  <a:noFill/>
+                </a:ln>
+                <a:solidFill>
+                  <a:srgbClr val="A9B7C6"/>
+                </a:solidFill>
+                <a:effectLst/>
+                <a:uLnTx/>
+                <a:uFillTx/>
+                <a:latin typeface="Courier New" panose="02070309020205020404" pitchFamily="49" charset="0"/>
+                <a:ea typeface="+mn-ea"/>
+                <a:cs typeface="Courier New" panose="02070309020205020404" pitchFamily="49" charset="0"/>
+              </a:rPr>
+              <a:t>Math</a:t>
+            </a:r>
+            <a:r>
+              <a:rPr kumimoji="0" lang="en-US" altLang="en-US" sz="1400" b="0" i="0" u="none" strike="noStrike" kern="1200" cap="none" spc="0" normalizeH="0" baseline="0" noProof="0" dirty="0" err="1">
+                <a:ln>
+                  <a:noFill/>
+                </a:ln>
+                <a:solidFill>
+                  <a:srgbClr val="AEB5BD"/>
+                </a:solidFill>
+                <a:effectLst/>
+                <a:uLnTx/>
+                <a:uFillTx/>
+                <a:latin typeface="Courier New" panose="02070309020205020404" pitchFamily="49" charset="0"/>
+                <a:ea typeface="+mn-ea"/>
+                <a:cs typeface="Courier New" panose="02070309020205020404" pitchFamily="49" charset="0"/>
+              </a:rPr>
+              <a:t>.</a:t>
+            </a:r>
+            <a:r>
+              <a:rPr kumimoji="0" lang="en-US" altLang="en-US" sz="1400" b="0" i="1" u="none" strike="noStrike" kern="1200" cap="none" spc="0" normalizeH="0" baseline="0" noProof="0" dirty="0" err="1">
+                <a:ln>
+                  <a:noFill/>
+                </a:ln>
+                <a:solidFill>
+                  <a:srgbClr val="AEB5BD"/>
+                </a:solidFill>
+                <a:effectLst/>
+                <a:uLnTx/>
+                <a:uFillTx/>
+                <a:latin typeface="Courier New" panose="02070309020205020404" pitchFamily="49" charset="0"/>
+                <a:ea typeface="+mn-ea"/>
+                <a:cs typeface="Courier New" panose="02070309020205020404" pitchFamily="49" charset="0"/>
+              </a:rPr>
+              <a:t>max</a:t>
+            </a:r>
+            <a:r>
+              <a:rPr kumimoji="0" lang="en-US" altLang="en-US" sz="1400" b="0" i="0" u="none" strike="noStrike" kern="1200" cap="none" spc="0" normalizeH="0" baseline="0" noProof="0" dirty="0">
+                <a:ln>
+                  <a:noFill/>
+                </a:ln>
+                <a:solidFill>
+                  <a:srgbClr val="AEB5BD"/>
+                </a:solidFill>
+                <a:effectLst/>
+                <a:uLnTx/>
+                <a:uFillTx/>
+                <a:latin typeface="Courier New" panose="02070309020205020404" pitchFamily="49" charset="0"/>
+                <a:ea typeface="+mn-ea"/>
+                <a:cs typeface="Courier New" panose="02070309020205020404" pitchFamily="49" charset="0"/>
+              </a:rPr>
+              <a:t>(</a:t>
+            </a:r>
+            <a:r>
+              <a:rPr kumimoji="0" lang="en-US" altLang="en-US" sz="1400" b="0" i="0" u="none" strike="noStrike" kern="1200" cap="none" spc="0" normalizeH="0" baseline="0" noProof="0" dirty="0" err="1">
+                <a:ln>
+                  <a:noFill/>
+                </a:ln>
+                <a:solidFill>
+                  <a:srgbClr val="A9B7C6"/>
+                </a:solidFill>
+                <a:effectLst/>
+                <a:uLnTx/>
+                <a:uFillTx/>
+                <a:latin typeface="Courier New" panose="02070309020205020404" pitchFamily="49" charset="0"/>
+                <a:ea typeface="+mn-ea"/>
+                <a:cs typeface="Courier New" panose="02070309020205020404" pitchFamily="49" charset="0"/>
+              </a:rPr>
+              <a:t>b</a:t>
+            </a:r>
+            <a:r>
+              <a:rPr kumimoji="0" lang="en-US" altLang="en-US" sz="1400" b="0" i="0" u="none" strike="noStrike" kern="1200" cap="none" spc="0" normalizeH="0" baseline="0" noProof="0" dirty="0" err="1">
+                <a:ln>
+                  <a:noFill/>
+                </a:ln>
+                <a:solidFill>
+                  <a:srgbClr val="5C7AB8"/>
+                </a:solidFill>
+                <a:effectLst/>
+                <a:uLnTx/>
+                <a:uFillTx/>
+                <a:latin typeface="Courier New" panose="02070309020205020404" pitchFamily="49" charset="0"/>
+                <a:ea typeface="+mn-ea"/>
+                <a:cs typeface="Courier New" panose="02070309020205020404" pitchFamily="49" charset="0"/>
+              </a:rPr>
+              <a:t>,</a:t>
+            </a:r>
+            <a:r>
+              <a:rPr kumimoji="0" lang="en-US" altLang="en-US" sz="1400" b="0" i="0" u="none" strike="noStrike" kern="1200" cap="none" spc="0" normalizeH="0" baseline="0" noProof="0" dirty="0" err="1">
+                <a:ln>
+                  <a:noFill/>
+                </a:ln>
+                <a:solidFill>
+                  <a:srgbClr val="A9B7C6"/>
+                </a:solidFill>
+                <a:effectLst/>
+                <a:uLnTx/>
+                <a:uFillTx/>
+                <a:latin typeface="Courier New" panose="02070309020205020404" pitchFamily="49" charset="0"/>
+                <a:ea typeface="+mn-ea"/>
+                <a:cs typeface="Courier New" panose="02070309020205020404" pitchFamily="49" charset="0"/>
+              </a:rPr>
+              <a:t>c</a:t>
+            </a:r>
+            <a:r>
+              <a:rPr kumimoji="0" lang="en-US" altLang="en-US" sz="1400" b="0" i="0" u="none" strike="noStrike" kern="1200" cap="none" spc="0" normalizeH="0" baseline="0" noProof="0" dirty="0">
+                <a:ln>
+                  <a:noFill/>
+                </a:ln>
+                <a:solidFill>
+                  <a:srgbClr val="AEB5BD"/>
+                </a:solidFill>
+                <a:effectLst/>
+                <a:uLnTx/>
+                <a:uFillTx/>
+                <a:latin typeface="Courier New" panose="02070309020205020404" pitchFamily="49" charset="0"/>
+                <a:ea typeface="+mn-ea"/>
+                <a:cs typeface="Courier New" panose="02070309020205020404" pitchFamily="49" charset="0"/>
+              </a:rPr>
+              <a:t>))</a:t>
+            </a:r>
+            <a:r>
+              <a:rPr kumimoji="0" lang="en-US" altLang="en-US" sz="1400" b="0" i="0" u="none" strike="noStrike" kern="1200" cap="none" spc="0" normalizeH="0" baseline="0" noProof="0" dirty="0">
+                <a:ln>
+                  <a:noFill/>
+                </a:ln>
+                <a:solidFill>
+                  <a:srgbClr val="597CC2"/>
+                </a:solidFill>
+                <a:effectLst/>
+                <a:uLnTx/>
+                <a:uFillTx/>
+                <a:latin typeface="Courier New" panose="02070309020205020404" pitchFamily="49" charset="0"/>
+                <a:ea typeface="+mn-ea"/>
+                <a:cs typeface="Courier New" panose="02070309020205020404" pitchFamily="49" charset="0"/>
+              </a:rPr>
+              <a:t>;</a:t>
+            </a:r>
+            <a:br>
+              <a:rPr kumimoji="0" lang="en-US" altLang="en-US" sz="1400" b="0" i="0" u="none" strike="noStrike" kern="1200" cap="none" spc="0" normalizeH="0" baseline="0" noProof="0" dirty="0">
+                <a:ln>
+                  <a:noFill/>
+                </a:ln>
+                <a:solidFill>
+                  <a:srgbClr val="597CC2"/>
+                </a:solidFill>
+                <a:effectLst/>
+                <a:uLnTx/>
+                <a:uFillTx/>
+                <a:latin typeface="Courier New" panose="02070309020205020404" pitchFamily="49" charset="0"/>
+                <a:ea typeface="+mn-ea"/>
+                <a:cs typeface="Courier New" panose="02070309020205020404" pitchFamily="49" charset="0"/>
+              </a:rPr>
+            </a:br>
+            <a:br>
+              <a:rPr kumimoji="0" lang="en-US" altLang="en-US" sz="1400" b="0" i="0" u="none" strike="noStrike" kern="1200" cap="none" spc="0" normalizeH="0" baseline="0" noProof="0" dirty="0">
+                <a:ln>
+                  <a:noFill/>
+                </a:ln>
+                <a:solidFill>
+                  <a:srgbClr val="597CC2"/>
+                </a:solidFill>
+                <a:effectLst/>
+                <a:uLnTx/>
+                <a:uFillTx/>
+                <a:latin typeface="Courier New" panose="02070309020205020404" pitchFamily="49" charset="0"/>
+                <a:ea typeface="+mn-ea"/>
+                <a:cs typeface="Courier New" panose="02070309020205020404" pitchFamily="49" charset="0"/>
+              </a:rPr>
+            </a:br>
+            <a:r>
+              <a:rPr kumimoji="0" lang="en-US" altLang="en-US" sz="1400" b="0" i="0" u="none" strike="noStrike" kern="1200" cap="none" spc="0" normalizeH="0" baseline="0" noProof="0" dirty="0">
+                <a:ln>
+                  <a:noFill/>
+                </a:ln>
+                <a:solidFill>
+                  <a:srgbClr val="597CC2"/>
+                </a:solidFill>
+                <a:effectLst/>
+                <a:uLnTx/>
+                <a:uFillTx/>
+                <a:latin typeface="Courier New" panose="02070309020205020404" pitchFamily="49" charset="0"/>
+                <a:ea typeface="+mn-ea"/>
+                <a:cs typeface="Courier New" panose="02070309020205020404" pitchFamily="49" charset="0"/>
+              </a:rPr>
+              <a:t>    if</a:t>
+            </a:r>
+            <a:r>
+              <a:rPr kumimoji="0" lang="en-US" altLang="en-US" sz="1400" b="0" i="0" u="none" strike="noStrike" kern="1200" cap="none" spc="0" normalizeH="0" baseline="0" noProof="0" dirty="0">
+                <a:ln>
+                  <a:noFill/>
+                </a:ln>
+                <a:solidFill>
+                  <a:srgbClr val="AEB5BD"/>
+                </a:solidFill>
+                <a:effectLst/>
+                <a:uLnTx/>
+                <a:uFillTx/>
+                <a:latin typeface="Courier New" panose="02070309020205020404" pitchFamily="49" charset="0"/>
+                <a:ea typeface="+mn-ea"/>
+                <a:cs typeface="Courier New" panose="02070309020205020404" pitchFamily="49" charset="0"/>
+              </a:rPr>
+              <a:t>( (</a:t>
+            </a:r>
+            <a:r>
+              <a:rPr kumimoji="0" lang="en-US" altLang="en-US" sz="1400" b="0" i="0" u="none" strike="noStrike" kern="1200" cap="none" spc="0" normalizeH="0" baseline="0" noProof="0" dirty="0">
+                <a:ln>
+                  <a:noFill/>
+                </a:ln>
+                <a:solidFill>
+                  <a:srgbClr val="A9B7C6"/>
+                </a:solidFill>
+                <a:effectLst/>
+                <a:uLnTx/>
+                <a:uFillTx/>
+                <a:latin typeface="Courier New" panose="02070309020205020404" pitchFamily="49" charset="0"/>
+                <a:ea typeface="+mn-ea"/>
+                <a:cs typeface="Courier New" panose="02070309020205020404" pitchFamily="49" charset="0"/>
+              </a:rPr>
+              <a:t>max </a:t>
+            </a:r>
+            <a:r>
+              <a:rPr kumimoji="0" lang="en-US" altLang="en-US" sz="1400" b="0" i="0" u="none" strike="noStrike" kern="1200" cap="none" spc="0" normalizeH="0" baseline="0" noProof="0" dirty="0">
+                <a:ln>
+                  <a:noFill/>
+                </a:ln>
+                <a:solidFill>
+                  <a:srgbClr val="AEB5BD"/>
+                </a:solidFill>
+                <a:effectLst/>
+                <a:uLnTx/>
+                <a:uFillTx/>
+                <a:latin typeface="Courier New" panose="02070309020205020404" pitchFamily="49" charset="0"/>
+                <a:ea typeface="+mn-ea"/>
+                <a:cs typeface="Courier New" panose="02070309020205020404" pitchFamily="49" charset="0"/>
+              </a:rPr>
+              <a:t>== </a:t>
+            </a:r>
+            <a:r>
+              <a:rPr kumimoji="0" lang="en-US" altLang="en-US" sz="1400" b="0" i="0" u="none" strike="noStrike" kern="1200" cap="none" spc="0" normalizeH="0" baseline="0" noProof="0" dirty="0">
+                <a:ln>
+                  <a:noFill/>
+                </a:ln>
+                <a:solidFill>
+                  <a:srgbClr val="A9B7C6"/>
+                </a:solidFill>
+                <a:effectLst/>
+                <a:uLnTx/>
+                <a:uFillTx/>
+                <a:latin typeface="Courier New" panose="02070309020205020404" pitchFamily="49" charset="0"/>
+                <a:ea typeface="+mn-ea"/>
+                <a:cs typeface="Courier New" panose="02070309020205020404" pitchFamily="49" charset="0"/>
+              </a:rPr>
               <a:t>a </a:t>
             </a:r>
             <a:r>
@@ -6260,7 +7460,109 @@
                 <a:ea typeface="+mn-ea"/>
                 <a:cs typeface="Courier New" panose="02070309020205020404" pitchFamily="49" charset="0"/>
               </a:rPr>
-              <a:t>&lt;=</a:t>
+              <a:t>&amp;&amp; </a:t>
+            </a:r>
+            <a:r>
+              <a:rPr kumimoji="0" lang="en-US" altLang="en-US" sz="1400" b="0" i="0" u="none" strike="noStrike" kern="1200" cap="none" spc="0" normalizeH="0" baseline="0" noProof="0" dirty="0">
+                <a:ln>
+                  <a:noFill/>
+                </a:ln>
+                <a:solidFill>
+                  <a:srgbClr val="A9B7C6"/>
+                </a:solidFill>
+                <a:effectLst/>
+                <a:uLnTx/>
+                <a:uFillTx/>
+                <a:latin typeface="Courier New" panose="02070309020205020404" pitchFamily="49" charset="0"/>
+                <a:ea typeface="+mn-ea"/>
+                <a:cs typeface="Courier New" panose="02070309020205020404" pitchFamily="49" charset="0"/>
+              </a:rPr>
+              <a:t>max </a:t>
+            </a:r>
+            <a:r>
+              <a:rPr kumimoji="0" lang="en-US" altLang="en-US" sz="1400" b="0" i="0" u="none" strike="noStrike" kern="1200" cap="none" spc="0" normalizeH="0" baseline="0" noProof="0" dirty="0">
+                <a:ln>
+                  <a:noFill/>
+                </a:ln>
+                <a:solidFill>
+                  <a:srgbClr val="AEB5BD"/>
+                </a:solidFill>
+                <a:effectLst/>
+                <a:uLnTx/>
+                <a:uFillTx/>
+                <a:latin typeface="Courier New" panose="02070309020205020404" pitchFamily="49" charset="0"/>
+                <a:ea typeface="+mn-ea"/>
+                <a:cs typeface="Courier New" panose="02070309020205020404" pitchFamily="49" charset="0"/>
+              </a:rPr>
+              <a:t>-</a:t>
+            </a:r>
+            <a:r>
+              <a:rPr kumimoji="0" lang="en-US" altLang="en-US" sz="1400" b="0" i="0" u="none" strike="noStrike" kern="1200" cap="none" spc="0" normalizeH="0" baseline="0" noProof="0" dirty="0">
+                <a:ln>
+                  <a:noFill/>
+                </a:ln>
+                <a:solidFill>
+                  <a:srgbClr val="A9B7C6"/>
+                </a:solidFill>
+                <a:effectLst/>
+                <a:uLnTx/>
+                <a:uFillTx/>
+                <a:latin typeface="Courier New" panose="02070309020205020404" pitchFamily="49" charset="0"/>
+                <a:ea typeface="+mn-ea"/>
+                <a:cs typeface="Courier New" panose="02070309020205020404" pitchFamily="49" charset="0"/>
+              </a:rPr>
+              <a:t>b </a:t>
+            </a:r>
+            <a:r>
+              <a:rPr kumimoji="0" lang="en-US" altLang="en-US" sz="1400" b="0" i="0" u="none" strike="noStrike" kern="1200" cap="none" spc="0" normalizeH="0" baseline="0" noProof="0" dirty="0">
+                <a:ln>
+                  <a:noFill/>
+                </a:ln>
+                <a:solidFill>
+                  <a:srgbClr val="AEB5BD"/>
+                </a:solidFill>
+                <a:effectLst/>
+                <a:uLnTx/>
+                <a:uFillTx/>
+                <a:latin typeface="Courier New" panose="02070309020205020404" pitchFamily="49" charset="0"/>
+                <a:ea typeface="+mn-ea"/>
+                <a:cs typeface="Courier New" panose="02070309020205020404" pitchFamily="49" charset="0"/>
+              </a:rPr>
+              <a:t>-</a:t>
+            </a:r>
+            <a:r>
+              <a:rPr kumimoji="0" lang="en-US" altLang="en-US" sz="1400" b="0" i="0" u="none" strike="noStrike" kern="1200" cap="none" spc="0" normalizeH="0" baseline="0" noProof="0" dirty="0">
+                <a:ln>
+                  <a:noFill/>
+                </a:ln>
+                <a:solidFill>
+                  <a:srgbClr val="A9B7C6"/>
+                </a:solidFill>
+                <a:effectLst/>
+                <a:uLnTx/>
+                <a:uFillTx/>
+                <a:latin typeface="Courier New" panose="02070309020205020404" pitchFamily="49" charset="0"/>
+                <a:ea typeface="+mn-ea"/>
+                <a:cs typeface="Courier New" panose="02070309020205020404" pitchFamily="49" charset="0"/>
+              </a:rPr>
+              <a:t>c </a:t>
+            </a:r>
+            <a:r>
+              <a:rPr kumimoji="0" lang="en-US" altLang="en-US" sz="1400" b="0" i="0" u="none" strike="noStrike" kern="1200" cap="none" spc="0" normalizeH="0" baseline="0" noProof="0" dirty="0">
+                <a:ln>
+                  <a:noFill/>
+                </a:ln>
+                <a:solidFill>
+                  <a:srgbClr val="AEB5BD"/>
+                </a:solidFill>
+                <a:effectLst/>
+                <a:uLnTx/>
+                <a:uFillTx/>
+                <a:latin typeface="Courier New" panose="02070309020205020404" pitchFamily="49" charset="0"/>
+                <a:ea typeface="+mn-ea"/>
+                <a:cs typeface="Courier New" panose="02070309020205020404" pitchFamily="49" charset="0"/>
+              </a:rPr>
+              <a:t>&gt;= </a:t>
             </a:r>
             <a:r>
               <a:rPr kumimoji="0" lang="en-US" altLang="en-US" sz="1400" b="0" i="0" u="none" strike="noStrike" kern="1200" cap="none" spc="0" normalizeH="0" baseline="0" noProof="0" dirty="0">
@@ -6294,7 +7596,40 @@
                 <a:ea typeface="+mn-ea"/>
                 <a:cs typeface="Courier New" panose="02070309020205020404" pitchFamily="49" charset="0"/>
               </a:rPr>
-              <a:t>|| </a:t>
+              <a:t>) ||</a:t>
+            </a:r>
+            <a:br>
+              <a:rPr kumimoji="0" lang="en-US" altLang="en-US" sz="1400" b="0" i="0" u="none" strike="noStrike" kern="1200" cap="none" spc="0" normalizeH="0" baseline="0" noProof="0" dirty="0">
+                <a:ln>
+                  <a:noFill/>
+                </a:ln>
+                <a:solidFill>
+                  <a:srgbClr val="AEB5BD"/>
+                </a:solidFill>
+                <a:effectLst/>
+                <a:uLnTx/>
+                <a:uFillTx/>
+                <a:latin typeface="Courier New" panose="02070309020205020404" pitchFamily="49" charset="0"/>
+                <a:ea typeface="+mn-ea"/>
+                <a:cs typeface="Courier New" panose="02070309020205020404" pitchFamily="49" charset="0"/>
+              </a:rPr>
+            </a:br>
+            <a:r>
+              <a:rPr kumimoji="0" lang="en-US" altLang="en-US" sz="1400" b="0" i="0" u="none" strike="noStrike" kern="1200" cap="none" spc="0" normalizeH="0" baseline="0" noProof="0" dirty="0">
+                <a:ln>
+                  <a:noFill/>
+                </a:ln>
+                <a:solidFill>
+                  <a:srgbClr val="AEB5BD"/>
+                </a:solidFill>
+                <a:effectLst/>
+                <a:uLnTx/>
+                <a:uFillTx/>
+                <a:latin typeface="Courier New" panose="02070309020205020404" pitchFamily="49" charset="0"/>
+                <a:ea typeface="+mn-ea"/>
+                <a:cs typeface="Courier New" panose="02070309020205020404" pitchFamily="49" charset="0"/>
+              </a:rPr>
+              <a:t>            (</a:t>
             </a:r>
             <a:r>
               <a:rPr kumimoji="0" lang="en-US" altLang="en-US" sz="1400" b="0" i="0" u="none" strike="noStrike" kern="1200" cap="none" spc="0" normalizeH="0" baseline="0" noProof="0" dirty="0">
@@ -6311,7 +7646,7 @@
                 <a:ea typeface="+mn-ea"/>
                 <a:cs typeface="Courier New" panose="02070309020205020404" pitchFamily="49" charset="0"/>
               </a:rPr>
-              <a:t>b</a:t>
+              <a:t>max </a:t>
             </a:r>
             <a:r>
               <a:rPr kumimoji="0" lang="en-US" altLang="en-US" sz="1400" b="0" i="0" u="none" strike="noStrike" kern="1200" cap="none" spc="0" normalizeH="0" baseline="0" noProof="0" dirty="0">
@@ -6328,7 +7663,143 @@
                 <a:ea typeface="+mn-ea"/>
                 <a:cs typeface="Courier New" panose="02070309020205020404" pitchFamily="49" charset="0"/>
               </a:rPr>
-              <a:t>&lt;= </a:t>
+              <a:t>== </a:t>
+            </a:r>
+            <a:r>
+              <a:rPr kumimoji="0" lang="en-US" altLang="en-US" sz="1400" b="0" i="0" u="none" strike="noStrike" kern="1200" cap="none" spc="0" normalizeH="0" baseline="0" noProof="0" dirty="0">
+                <a:ln>
+                  <a:noFill/>
+                </a:ln>
+                <a:solidFill>
+                  <a:srgbClr val="A9B7C6"/>
+                </a:solidFill>
+                <a:effectLst/>
+                <a:uLnTx/>
+                <a:uFillTx/>
+                <a:latin typeface="Courier New" panose="02070309020205020404" pitchFamily="49" charset="0"/>
+                <a:ea typeface="+mn-ea"/>
+                <a:cs typeface="Courier New" panose="02070309020205020404" pitchFamily="49" charset="0"/>
+              </a:rPr>
+              <a:t>b </a:t>
+            </a:r>
+            <a:r>
+              <a:rPr kumimoji="0" lang="en-US" altLang="en-US" sz="1400" b="0" i="0" u="none" strike="noStrike" kern="1200" cap="none" spc="0" normalizeH="0" baseline="0" noProof="0" dirty="0">
+                <a:ln>
+                  <a:noFill/>
+                </a:ln>
+                <a:solidFill>
+                  <a:srgbClr val="AEB5BD"/>
+                </a:solidFill>
+                <a:effectLst/>
+                <a:uLnTx/>
+                <a:uFillTx/>
+                <a:latin typeface="Courier New" panose="02070309020205020404" pitchFamily="49" charset="0"/>
+                <a:ea typeface="+mn-ea"/>
+                <a:cs typeface="Courier New" panose="02070309020205020404" pitchFamily="49" charset="0"/>
+              </a:rPr>
+              <a:t>&amp;&amp; </a:t>
+            </a:r>
+            <a:r>
+              <a:rPr kumimoji="0" lang="en-US" altLang="en-US" sz="1400" b="0" i="0" u="none" strike="noStrike" kern="1200" cap="none" spc="0" normalizeH="0" baseline="0" noProof="0" dirty="0">
+                <a:ln>
+                  <a:noFill/>
+                </a:ln>
+                <a:solidFill>
+                  <a:srgbClr val="A9B7C6"/>
+                </a:solidFill>
+                <a:effectLst/>
+                <a:uLnTx/>
+                <a:uFillTx/>
+                <a:latin typeface="Courier New" panose="02070309020205020404" pitchFamily="49" charset="0"/>
+                <a:ea typeface="+mn-ea"/>
+                <a:cs typeface="Courier New" panose="02070309020205020404" pitchFamily="49" charset="0"/>
+              </a:rPr>
+              <a:t>max </a:t>
+            </a:r>
+            <a:r>
+              <a:rPr kumimoji="0" lang="en-US" altLang="en-US" sz="1400" b="0" i="0" u="none" strike="noStrike" kern="1200" cap="none" spc="0" normalizeH="0" baseline="0" noProof="0" dirty="0">
+                <a:ln>
+                  <a:noFill/>
+                </a:ln>
+                <a:solidFill>
+                  <a:srgbClr val="AEB5BD"/>
+                </a:solidFill>
+                <a:effectLst/>
+                <a:uLnTx/>
+                <a:uFillTx/>
+                <a:latin typeface="Courier New" panose="02070309020205020404" pitchFamily="49" charset="0"/>
+                <a:ea typeface="+mn-ea"/>
+                <a:cs typeface="Courier New" panose="02070309020205020404" pitchFamily="49" charset="0"/>
+              </a:rPr>
+              <a:t>-</a:t>
+            </a:r>
+            <a:r>
+              <a:rPr kumimoji="0" lang="en-US" altLang="en-US" sz="1400" b="0" i="0" u="none" strike="noStrike" kern="1200" cap="none" spc="0" normalizeH="0" baseline="0" noProof="0" dirty="0">
+                <a:ln>
+                  <a:noFill/>
+                </a:ln>
+                <a:solidFill>
+                  <a:srgbClr val="A9B7C6"/>
+                </a:solidFill>
+                <a:effectLst/>
+                <a:uLnTx/>
+                <a:uFillTx/>
+                <a:latin typeface="Courier New" panose="02070309020205020404" pitchFamily="49" charset="0"/>
+                <a:ea typeface="+mn-ea"/>
+                <a:cs typeface="Courier New" panose="02070309020205020404" pitchFamily="49" charset="0"/>
+              </a:rPr>
+              <a:t>a </a:t>
+            </a:r>
+            <a:r>
+              <a:rPr kumimoji="0" lang="en-US" altLang="en-US" sz="1400" b="0" i="0" u="none" strike="noStrike" kern="1200" cap="none" spc="0" normalizeH="0" baseline="0" noProof="0" dirty="0">
+                <a:ln>
+                  <a:noFill/>
+                </a:ln>
+                <a:solidFill>
+                  <a:srgbClr val="AEB5BD"/>
+                </a:solidFill>
+                <a:effectLst/>
+                <a:uLnTx/>
+                <a:uFillTx/>
+                <a:latin typeface="Courier New" panose="02070309020205020404" pitchFamily="49" charset="0"/>
+                <a:ea typeface="+mn-ea"/>
+                <a:cs typeface="Courier New" panose="02070309020205020404" pitchFamily="49" charset="0"/>
+              </a:rPr>
+              <a:t>-</a:t>
+            </a:r>
+            <a:r>
+              <a:rPr kumimoji="0" lang="en-US" altLang="en-US" sz="1400" b="0" i="0" u="none" strike="noStrike" kern="1200" cap="none" spc="0" normalizeH="0" baseline="0" noProof="0" dirty="0">
+                <a:ln>
+                  <a:noFill/>
+                </a:ln>
+                <a:solidFill>
+                  <a:srgbClr val="A9B7C6"/>
+                </a:solidFill>
+                <a:effectLst/>
+                <a:uLnTx/>
+                <a:uFillTx/>
+                <a:latin typeface="Courier New" panose="02070309020205020404" pitchFamily="49" charset="0"/>
+                <a:ea typeface="+mn-ea"/>
+                <a:cs typeface="Courier New" panose="02070309020205020404" pitchFamily="49" charset="0"/>
+              </a:rPr>
+              <a:t>c </a:t>
+            </a:r>
+            <a:r>
+              <a:rPr kumimoji="0" lang="en-US" altLang="en-US" sz="1400" b="0" i="0" u="none" strike="noStrike" kern="1200" cap="none" spc="0" normalizeH="0" baseline="0" noProof="0" dirty="0">
+                <a:ln>
+                  <a:noFill/>
+                </a:ln>
+                <a:solidFill>
+                  <a:srgbClr val="AEB5BD"/>
+                </a:solidFill>
+                <a:effectLst/>
+                <a:uLnTx/>
+                <a:uFillTx/>
+                <a:latin typeface="Courier New" panose="02070309020205020404" pitchFamily="49" charset="0"/>
+                <a:ea typeface="+mn-ea"/>
+                <a:cs typeface="Courier New" panose="02070309020205020404" pitchFamily="49" charset="0"/>
+              </a:rPr>
+              <a:t>&gt;= </a:t>
             </a:r>
             <a:r>
               <a:rPr kumimoji="0" lang="en-US" altLang="en-US" sz="1400" b="0" i="0" u="none" strike="noStrike" kern="1200" cap="none" spc="0" normalizeH="0" baseline="0" noProof="0" dirty="0">
@@ -6362,7 +7833,40 @@
                 <a:ea typeface="+mn-ea"/>
                 <a:cs typeface="Courier New" panose="02070309020205020404" pitchFamily="49" charset="0"/>
               </a:rPr>
-              <a:t>|| </a:t>
+              <a:t>) ||</a:t>
+            </a:r>
+            <a:br>
+              <a:rPr kumimoji="0" lang="en-US" altLang="en-US" sz="1400" b="0" i="0" u="none" strike="noStrike" kern="1200" cap="none" spc="0" normalizeH="0" baseline="0" noProof="0" dirty="0">
+                <a:ln>
+                  <a:noFill/>
+                </a:ln>
+                <a:solidFill>
+                  <a:srgbClr val="AEB5BD"/>
+                </a:solidFill>
+                <a:effectLst/>
+                <a:uLnTx/>
+                <a:uFillTx/>
+                <a:latin typeface="Courier New" panose="02070309020205020404" pitchFamily="49" charset="0"/>
+                <a:ea typeface="+mn-ea"/>
+                <a:cs typeface="Courier New" panose="02070309020205020404" pitchFamily="49" charset="0"/>
+              </a:rPr>
+            </a:br>
+            <a:r>
+              <a:rPr kumimoji="0" lang="en-US" altLang="en-US" sz="1400" b="0" i="0" u="none" strike="noStrike" kern="1200" cap="none" spc="0" normalizeH="0" baseline="0" noProof="0" dirty="0">
+                <a:ln>
+                  <a:noFill/>
+                </a:ln>
+                <a:solidFill>
+                  <a:srgbClr val="AEB5BD"/>
+                </a:solidFill>
+                <a:effectLst/>
+                <a:uLnTx/>
+                <a:uFillTx/>
+                <a:latin typeface="Courier New" panose="02070309020205020404" pitchFamily="49" charset="0"/>
+                <a:ea typeface="+mn-ea"/>
+                <a:cs typeface="Courier New" panose="02070309020205020404" pitchFamily="49" charset="0"/>
+              </a:rPr>
+              <a:t>            (</a:t>
             </a:r>
             <a:r>
               <a:rPr kumimoji="0" lang="en-US" altLang="en-US" sz="1400" b="0" i="0" u="none" strike="noStrike" kern="1200" cap="none" spc="0" normalizeH="0" baseline="0" noProof="0" dirty="0">
@@ -6379,7 +7883,7 @@
                 <a:ea typeface="+mn-ea"/>
                 <a:cs typeface="Courier New" panose="02070309020205020404" pitchFamily="49" charset="0"/>
               </a:rPr>
-              <a:t>c</a:t>
+              <a:t>max </a:t>
             </a:r>
             <a:r>
               <a:rPr kumimoji="0" lang="en-US" altLang="en-US" sz="1400" b="0" i="0" u="none" strike="noStrike" kern="1200" cap="none" spc="0" normalizeH="0" baseline="0" noProof="0" dirty="0">
@@ -6396,7 +7900,143 @@
                 <a:ea typeface="+mn-ea"/>
                 <a:cs typeface="Courier New" panose="02070309020205020404" pitchFamily="49" charset="0"/>
               </a:rPr>
-              <a:t>&lt;= </a:t>
+              <a:t>== </a:t>
+            </a:r>
+            <a:r>
+              <a:rPr kumimoji="0" lang="en-US" altLang="en-US" sz="1400" b="0" i="0" u="none" strike="noStrike" kern="1200" cap="none" spc="0" normalizeH="0" baseline="0" noProof="0" dirty="0">
+                <a:ln>
+                  <a:noFill/>
+                </a:ln>
+                <a:solidFill>
+                  <a:srgbClr val="A9B7C6"/>
+                </a:solidFill>
+                <a:effectLst/>
+                <a:uLnTx/>
+                <a:uFillTx/>
+                <a:latin typeface="Courier New" panose="02070309020205020404" pitchFamily="49" charset="0"/>
+                <a:ea typeface="+mn-ea"/>
+                <a:cs typeface="Courier New" panose="02070309020205020404" pitchFamily="49" charset="0"/>
+              </a:rPr>
+              <a:t>c </a:t>
+            </a:r>
+            <a:r>
+              <a:rPr kumimoji="0" lang="en-US" altLang="en-US" sz="1400" b="0" i="0" u="none" strike="noStrike" kern="1200" cap="none" spc="0" normalizeH="0" baseline="0" noProof="0" dirty="0">
+                <a:ln>
+                  <a:noFill/>
+                </a:ln>
+                <a:solidFill>
+                  <a:srgbClr val="AEB5BD"/>
+                </a:solidFill>
+                <a:effectLst/>
+                <a:uLnTx/>
+                <a:uFillTx/>
+                <a:latin typeface="Courier New" panose="02070309020205020404" pitchFamily="49" charset="0"/>
+                <a:ea typeface="+mn-ea"/>
+                <a:cs typeface="Courier New" panose="02070309020205020404" pitchFamily="49" charset="0"/>
+              </a:rPr>
+              <a:t>&amp;&amp; </a:t>
+            </a:r>
+            <a:r>
+              <a:rPr kumimoji="0" lang="en-US" altLang="en-US" sz="1400" b="0" i="0" u="none" strike="noStrike" kern="1200" cap="none" spc="0" normalizeH="0" baseline="0" noProof="0" dirty="0">
+                <a:ln>
+                  <a:noFill/>
+                </a:ln>
+                <a:solidFill>
+                  <a:srgbClr val="A9B7C6"/>
+                </a:solidFill>
+                <a:effectLst/>
+                <a:uLnTx/>
+                <a:uFillTx/>
+                <a:latin typeface="Courier New" panose="02070309020205020404" pitchFamily="49" charset="0"/>
+                <a:ea typeface="+mn-ea"/>
+                <a:cs typeface="Courier New" panose="02070309020205020404" pitchFamily="49" charset="0"/>
+              </a:rPr>
+              <a:t>max </a:t>
+            </a:r>
+            <a:r>
+              <a:rPr kumimoji="0" lang="en-US" altLang="en-US" sz="1400" b="0" i="0" u="none" strike="noStrike" kern="1200" cap="none" spc="0" normalizeH="0" baseline="0" noProof="0" dirty="0">
+                <a:ln>
+                  <a:noFill/>
+                </a:ln>
+                <a:solidFill>
+                  <a:srgbClr val="AEB5BD"/>
+                </a:solidFill>
+                <a:effectLst/>
+                <a:uLnTx/>
+                <a:uFillTx/>
+                <a:latin typeface="Courier New" panose="02070309020205020404" pitchFamily="49" charset="0"/>
+                <a:ea typeface="+mn-ea"/>
+                <a:cs typeface="Courier New" panose="02070309020205020404" pitchFamily="49" charset="0"/>
+              </a:rPr>
+              <a:t>-</a:t>
+            </a:r>
+            <a:r>
+              <a:rPr kumimoji="0" lang="en-US" altLang="en-US" sz="1400" b="0" i="0" u="none" strike="noStrike" kern="1200" cap="none" spc="0" normalizeH="0" baseline="0" noProof="0" dirty="0">
+                <a:ln>
+                  <a:noFill/>
+                </a:ln>
+                <a:solidFill>
+                  <a:srgbClr val="A9B7C6"/>
+                </a:solidFill>
+                <a:effectLst/>
+                <a:uLnTx/>
+                <a:uFillTx/>
+                <a:latin typeface="Courier New" panose="02070309020205020404" pitchFamily="49" charset="0"/>
+                <a:ea typeface="+mn-ea"/>
+                <a:cs typeface="Courier New" panose="02070309020205020404" pitchFamily="49" charset="0"/>
+              </a:rPr>
+              <a:t>a </a:t>
+            </a:r>
+            <a:r>
+              <a:rPr kumimoji="0" lang="en-US" altLang="en-US" sz="1400" b="0" i="0" u="none" strike="noStrike" kern="1200" cap="none" spc="0" normalizeH="0" baseline="0" noProof="0" dirty="0">
+                <a:ln>
+                  <a:noFill/>
+                </a:ln>
+                <a:solidFill>
+                  <a:srgbClr val="AEB5BD"/>
+                </a:solidFill>
+                <a:effectLst/>
+                <a:uLnTx/>
+                <a:uFillTx/>
+                <a:latin typeface="Courier New" panose="02070309020205020404" pitchFamily="49" charset="0"/>
+                <a:ea typeface="+mn-ea"/>
+                <a:cs typeface="Courier New" panose="02070309020205020404" pitchFamily="49" charset="0"/>
+              </a:rPr>
+              <a:t>-</a:t>
+            </a:r>
+            <a:r>
+              <a:rPr kumimoji="0" lang="en-US" altLang="en-US" sz="1400" b="0" i="0" u="none" strike="noStrike" kern="1200" cap="none" spc="0" normalizeH="0" baseline="0" noProof="0" dirty="0">
+                <a:ln>
+                  <a:noFill/>
+                </a:ln>
+                <a:solidFill>
+                  <a:srgbClr val="A9B7C6"/>
+                </a:solidFill>
+                <a:effectLst/>
+                <a:uLnTx/>
+                <a:uFillTx/>
+                <a:latin typeface="Courier New" panose="02070309020205020404" pitchFamily="49" charset="0"/>
+                <a:ea typeface="+mn-ea"/>
+                <a:cs typeface="Courier New" panose="02070309020205020404" pitchFamily="49" charset="0"/>
+              </a:rPr>
+              <a:t>b </a:t>
+            </a:r>
+            <a:r>
+              <a:rPr kumimoji="0" lang="en-US" altLang="en-US" sz="1400" b="0" i="0" u="none" strike="noStrike" kern="1200" cap="none" spc="0" normalizeH="0" baseline="0" noProof="0" dirty="0">
+                <a:ln>
+                  <a:noFill/>
+                </a:ln>
+                <a:solidFill>
+                  <a:srgbClr val="AEB5BD"/>
+                </a:solidFill>
+                <a:effectLst/>
+                <a:uLnTx/>
+                <a:uFillTx/>
+                <a:latin typeface="Courier New" panose="02070309020205020404" pitchFamily="49" charset="0"/>
+                <a:ea typeface="+mn-ea"/>
+                <a:cs typeface="Courier New" panose="02070309020205020404" pitchFamily="49" charset="0"/>
+              </a:rPr>
+              <a:t>&gt;= </a:t>
             </a:r>
             <a:r>
               <a:rPr kumimoji="0" lang="en-US" altLang="en-US" sz="1400" b="0" i="0" u="none" strike="noStrike" kern="1200" cap="none" spc="0" normalizeH="0" baseline="0" noProof="0" dirty="0">
@@ -6413,7 +8053,7 @@
                 <a:ea typeface="+mn-ea"/>
                 <a:cs typeface="Courier New" panose="02070309020205020404" pitchFamily="49" charset="0"/>
               </a:rPr>
-              <a:t>0</a:t>
+              <a:t>0 </a:t>
             </a:r>
             <a:r>
               <a:rPr kumimoji="0" lang="en-US" altLang="en-US" sz="1400" b="0" i="0" u="none" strike="noStrike" kern="1200" cap="none" spc="0" normalizeH="0" baseline="0" noProof="0" dirty="0">
@@ -6430,7 +8070,7 @@
                 <a:ea typeface="+mn-ea"/>
                 <a:cs typeface="Courier New" panose="02070309020205020404" pitchFamily="49" charset="0"/>
               </a:rPr>
-              <a:t>){</a:t>
+              <a:t>) ){</a:t>
             </a:r>
             <a:br>
               <a:rPr kumimoji="0" lang="en-US" altLang="en-US" sz="1400" b="0" i="0" u="none" strike="noStrike" kern="1200" cap="none" spc="0" normalizeH="0" baseline="0" noProof="0" dirty="0">
@@ -6616,1745 +8256,6 @@
                 <a:cs typeface="Courier New" panose="02070309020205020404" pitchFamily="49" charset="0"/>
               </a:rPr>
             </a:br>
-            <a:r>
-              <a:rPr kumimoji="0" lang="en-US" altLang="en-US" sz="1400" b="0" i="0" u="none" strike="noStrike" kern="1200" cap="none" spc="0" normalizeH="0" baseline="0" noProof="0" dirty="0">
-                <a:ln>
-                  <a:noFill/>
-                </a:ln>
-                <a:solidFill>
-                  <a:srgbClr val="AEB5BD"/>
-                </a:solidFill>
-                <a:effectLst/>
-                <a:uLnTx/>
-                <a:uFillTx/>
-                <a:latin typeface="Courier New" panose="02070309020205020404" pitchFamily="49" charset="0"/>
-                <a:ea typeface="+mn-ea"/>
-                <a:cs typeface="Courier New" panose="02070309020205020404" pitchFamily="49" charset="0"/>
-              </a:rPr>
-              <a:t/>
-            </a:r>
-            <a:br>
-              <a:rPr kumimoji="0" lang="en-US" altLang="en-US" sz="1400" b="0" i="0" u="none" strike="noStrike" kern="1200" cap="none" spc="0" normalizeH="0" baseline="0" noProof="0" dirty="0">
-                <a:ln>
-                  <a:noFill/>
-                </a:ln>
-                <a:solidFill>
-                  <a:srgbClr val="AEB5BD"/>
-                </a:solidFill>
-                <a:effectLst/>
-                <a:uLnTx/>
-                <a:uFillTx/>
-                <a:latin typeface="Courier New" panose="02070309020205020404" pitchFamily="49" charset="0"/>
-                <a:ea typeface="+mn-ea"/>
-                <a:cs typeface="Courier New" panose="02070309020205020404" pitchFamily="49" charset="0"/>
-              </a:rPr>
-            </a:br>
-            <a:r>
-              <a:rPr kumimoji="0" lang="en-US" altLang="en-US" sz="1400" b="0" i="0" u="none" strike="noStrike" kern="1200" cap="none" spc="0" normalizeH="0" baseline="0" noProof="0" dirty="0">
-                <a:ln>
-                  <a:noFill/>
-                </a:ln>
-                <a:solidFill>
-                  <a:srgbClr val="AEB5BD"/>
-                </a:solidFill>
-                <a:effectLst/>
-                <a:uLnTx/>
-                <a:uFillTx/>
-                <a:latin typeface="Courier New" panose="02070309020205020404" pitchFamily="49" charset="0"/>
-                <a:ea typeface="+mn-ea"/>
-                <a:cs typeface="Courier New" panose="02070309020205020404" pitchFamily="49" charset="0"/>
-              </a:rPr>
-              <a:t>    </a:t>
-            </a:r>
-            <a:r>
-              <a:rPr kumimoji="0" lang="en-US" altLang="en-US" sz="1400" b="0" i="0" u="none" strike="noStrike" kern="1200" cap="none" spc="0" normalizeH="0" baseline="0" noProof="0" dirty="0">
-                <a:ln>
-                  <a:noFill/>
-                </a:ln>
-                <a:solidFill>
-                  <a:srgbClr val="597CC2"/>
-                </a:solidFill>
-                <a:effectLst/>
-                <a:uLnTx/>
-                <a:uFillTx/>
-                <a:latin typeface="Courier New" panose="02070309020205020404" pitchFamily="49" charset="0"/>
-                <a:ea typeface="+mn-ea"/>
-                <a:cs typeface="Courier New" panose="02070309020205020404" pitchFamily="49" charset="0"/>
-              </a:rPr>
-              <a:t>if</a:t>
-            </a:r>
-            <a:r>
-              <a:rPr kumimoji="0" lang="en-US" altLang="en-US" sz="1400" b="0" i="0" u="none" strike="noStrike" kern="1200" cap="none" spc="0" normalizeH="0" baseline="0" noProof="0" dirty="0">
-                <a:ln>
-                  <a:noFill/>
-                </a:ln>
-                <a:solidFill>
-                  <a:srgbClr val="AEB5BD"/>
-                </a:solidFill>
-                <a:effectLst/>
-                <a:uLnTx/>
-                <a:uFillTx/>
-                <a:latin typeface="Courier New" panose="02070309020205020404" pitchFamily="49" charset="0"/>
-                <a:ea typeface="+mn-ea"/>
-                <a:cs typeface="Courier New" panose="02070309020205020404" pitchFamily="49" charset="0"/>
-              </a:rPr>
-              <a:t>(</a:t>
-            </a:r>
-            <a:r>
-              <a:rPr kumimoji="0" lang="en-US" altLang="en-US" sz="1400" b="0" i="0" u="none" strike="noStrike" kern="1200" cap="none" spc="0" normalizeH="0" baseline="0" noProof="0" dirty="0">
-                <a:ln>
-                  <a:noFill/>
-                </a:ln>
-                <a:solidFill>
-                  <a:srgbClr val="A9B7C6"/>
-                </a:solidFill>
-                <a:effectLst/>
-                <a:uLnTx/>
-                <a:uFillTx/>
-                <a:latin typeface="Courier New" panose="02070309020205020404" pitchFamily="49" charset="0"/>
-                <a:ea typeface="+mn-ea"/>
-                <a:cs typeface="Courier New" panose="02070309020205020404" pitchFamily="49" charset="0"/>
-              </a:rPr>
-              <a:t>a</a:t>
-            </a:r>
-            <a:r>
-              <a:rPr kumimoji="0" lang="en-US" altLang="en-US" sz="1400" b="0" i="0" u="none" strike="noStrike" kern="1200" cap="none" spc="0" normalizeH="0" baseline="0" noProof="0" dirty="0">
-                <a:ln>
-                  <a:noFill/>
-                </a:ln>
-                <a:solidFill>
-                  <a:srgbClr val="AEB5BD"/>
-                </a:solidFill>
-                <a:effectLst/>
-                <a:uLnTx/>
-                <a:uFillTx/>
-                <a:latin typeface="Courier New" panose="02070309020205020404" pitchFamily="49" charset="0"/>
-                <a:ea typeface="+mn-ea"/>
-                <a:cs typeface="Courier New" panose="02070309020205020404" pitchFamily="49" charset="0"/>
-              </a:rPr>
-              <a:t>==</a:t>
-            </a:r>
-            <a:r>
-              <a:rPr kumimoji="0" lang="en-US" altLang="en-US" sz="1400" b="0" i="0" u="none" strike="noStrike" kern="1200" cap="none" spc="0" normalizeH="0" baseline="0" noProof="0" dirty="0">
-                <a:ln>
-                  <a:noFill/>
-                </a:ln>
-                <a:solidFill>
-                  <a:srgbClr val="A9B7C6"/>
-                </a:solidFill>
-                <a:effectLst/>
-                <a:uLnTx/>
-                <a:uFillTx/>
-                <a:latin typeface="Courier New" panose="02070309020205020404" pitchFamily="49" charset="0"/>
-                <a:ea typeface="+mn-ea"/>
-                <a:cs typeface="Courier New" panose="02070309020205020404" pitchFamily="49" charset="0"/>
-              </a:rPr>
-              <a:t>b </a:t>
-            </a:r>
-            <a:r>
-              <a:rPr kumimoji="0" lang="en-US" altLang="en-US" sz="1400" b="0" i="0" u="none" strike="noStrike" kern="1200" cap="none" spc="0" normalizeH="0" baseline="0" noProof="0" dirty="0">
-                <a:ln>
-                  <a:noFill/>
-                </a:ln>
-                <a:solidFill>
-                  <a:srgbClr val="AEB5BD"/>
-                </a:solidFill>
-                <a:effectLst/>
-                <a:uLnTx/>
-                <a:uFillTx/>
-                <a:latin typeface="Courier New" panose="02070309020205020404" pitchFamily="49" charset="0"/>
-                <a:ea typeface="+mn-ea"/>
-                <a:cs typeface="Courier New" panose="02070309020205020404" pitchFamily="49" charset="0"/>
-              </a:rPr>
-              <a:t>&amp;&amp; </a:t>
-            </a:r>
-            <a:r>
-              <a:rPr kumimoji="0" lang="en-US" altLang="en-US" sz="1400" b="0" i="0" u="none" strike="noStrike" kern="1200" cap="none" spc="0" normalizeH="0" baseline="0" noProof="0" dirty="0">
-                <a:ln>
-                  <a:noFill/>
-                </a:ln>
-                <a:solidFill>
-                  <a:srgbClr val="A9B7C6"/>
-                </a:solidFill>
-                <a:effectLst/>
-                <a:uLnTx/>
-                <a:uFillTx/>
-                <a:latin typeface="Courier New" panose="02070309020205020404" pitchFamily="49" charset="0"/>
-                <a:ea typeface="+mn-ea"/>
-                <a:cs typeface="Courier New" panose="02070309020205020404" pitchFamily="49" charset="0"/>
-              </a:rPr>
-              <a:t>b</a:t>
-            </a:r>
-            <a:r>
-              <a:rPr kumimoji="0" lang="en-US" altLang="en-US" sz="1400" b="0" i="0" u="none" strike="noStrike" kern="1200" cap="none" spc="0" normalizeH="0" baseline="0" noProof="0" dirty="0">
-                <a:ln>
-                  <a:noFill/>
-                </a:ln>
-                <a:solidFill>
-                  <a:srgbClr val="AEB5BD"/>
-                </a:solidFill>
-                <a:effectLst/>
-                <a:uLnTx/>
-                <a:uFillTx/>
-                <a:latin typeface="Courier New" panose="02070309020205020404" pitchFamily="49" charset="0"/>
-                <a:ea typeface="+mn-ea"/>
-                <a:cs typeface="Courier New" panose="02070309020205020404" pitchFamily="49" charset="0"/>
-              </a:rPr>
-              <a:t>==</a:t>
-            </a:r>
-            <a:r>
-              <a:rPr kumimoji="0" lang="en-US" altLang="en-US" sz="1400" b="0" i="0" u="none" strike="noStrike" kern="1200" cap="none" spc="0" normalizeH="0" baseline="0" noProof="0" dirty="0">
-                <a:ln>
-                  <a:noFill/>
-                </a:ln>
-                <a:solidFill>
-                  <a:srgbClr val="A9B7C6"/>
-                </a:solidFill>
-                <a:effectLst/>
-                <a:uLnTx/>
-                <a:uFillTx/>
-                <a:latin typeface="Courier New" panose="02070309020205020404" pitchFamily="49" charset="0"/>
-                <a:ea typeface="+mn-ea"/>
-                <a:cs typeface="Courier New" panose="02070309020205020404" pitchFamily="49" charset="0"/>
-              </a:rPr>
-              <a:t>c</a:t>
-            </a:r>
-            <a:r>
-              <a:rPr kumimoji="0" lang="en-US" altLang="en-US" sz="1400" b="0" i="0" u="none" strike="noStrike" kern="1200" cap="none" spc="0" normalizeH="0" baseline="0" noProof="0" dirty="0">
-                <a:ln>
-                  <a:noFill/>
-                </a:ln>
-                <a:solidFill>
-                  <a:srgbClr val="AEB5BD"/>
-                </a:solidFill>
-                <a:effectLst/>
-                <a:uLnTx/>
-                <a:uFillTx/>
-                <a:latin typeface="Courier New" panose="02070309020205020404" pitchFamily="49" charset="0"/>
-                <a:ea typeface="+mn-ea"/>
-                <a:cs typeface="Courier New" panose="02070309020205020404" pitchFamily="49" charset="0"/>
-              </a:rPr>
-              <a:t>){</a:t>
-            </a:r>
-            <a:br>
-              <a:rPr kumimoji="0" lang="en-US" altLang="en-US" sz="1400" b="0" i="0" u="none" strike="noStrike" kern="1200" cap="none" spc="0" normalizeH="0" baseline="0" noProof="0" dirty="0">
-                <a:ln>
-                  <a:noFill/>
-                </a:ln>
-                <a:solidFill>
-                  <a:srgbClr val="AEB5BD"/>
-                </a:solidFill>
-                <a:effectLst/>
-                <a:uLnTx/>
-                <a:uFillTx/>
-                <a:latin typeface="Courier New" panose="02070309020205020404" pitchFamily="49" charset="0"/>
-                <a:ea typeface="+mn-ea"/>
-                <a:cs typeface="Courier New" panose="02070309020205020404" pitchFamily="49" charset="0"/>
-              </a:rPr>
-            </a:br>
-            <a:r>
-              <a:rPr kumimoji="0" lang="en-US" altLang="en-US" sz="1400" b="0" i="0" u="none" strike="noStrike" kern="1200" cap="none" spc="0" normalizeH="0" baseline="0" noProof="0" dirty="0">
-                <a:ln>
-                  <a:noFill/>
-                </a:ln>
-                <a:solidFill>
-                  <a:srgbClr val="AEB5BD"/>
-                </a:solidFill>
-                <a:effectLst/>
-                <a:uLnTx/>
-                <a:uFillTx/>
-                <a:latin typeface="Courier New" panose="02070309020205020404" pitchFamily="49" charset="0"/>
-                <a:ea typeface="+mn-ea"/>
-                <a:cs typeface="Courier New" panose="02070309020205020404" pitchFamily="49" charset="0"/>
-              </a:rPr>
-              <a:t>        </a:t>
-            </a:r>
-            <a:r>
-              <a:rPr kumimoji="0" lang="en-US" altLang="en-US" sz="1400" b="0" i="0" u="none" strike="noStrike" kern="1200" cap="none" spc="0" normalizeH="0" baseline="0" noProof="0" dirty="0">
-                <a:ln>
-                  <a:noFill/>
-                </a:ln>
-                <a:solidFill>
-                  <a:srgbClr val="597CC2"/>
-                </a:solidFill>
-                <a:effectLst/>
-                <a:uLnTx/>
-                <a:uFillTx/>
-                <a:latin typeface="Courier New" panose="02070309020205020404" pitchFamily="49" charset="0"/>
-                <a:ea typeface="+mn-ea"/>
-                <a:cs typeface="Courier New" panose="02070309020205020404" pitchFamily="49" charset="0"/>
-              </a:rPr>
-              <a:t>return </a:t>
-            </a:r>
-            <a:r>
-              <a:rPr kumimoji="0" lang="en-US" altLang="en-US" sz="1400" b="0" i="0" u="none" strike="noStrike" kern="1200" cap="none" spc="0" normalizeH="0" baseline="0" noProof="0" dirty="0" err="1">
-                <a:ln>
-                  <a:noFill/>
-                </a:ln>
-                <a:solidFill>
-                  <a:srgbClr val="A9B7C6"/>
-                </a:solidFill>
-                <a:effectLst/>
-                <a:uLnTx/>
-                <a:uFillTx/>
-                <a:latin typeface="Courier New" panose="02070309020205020404" pitchFamily="49" charset="0"/>
-                <a:ea typeface="+mn-ea"/>
-                <a:cs typeface="Courier New" panose="02070309020205020404" pitchFamily="49" charset="0"/>
-              </a:rPr>
-              <a:t>Classification</a:t>
-            </a:r>
-            <a:r>
-              <a:rPr kumimoji="0" lang="en-US" altLang="en-US" sz="1400" b="0" i="0" u="none" strike="noStrike" kern="1200" cap="none" spc="0" normalizeH="0" baseline="0" noProof="0" dirty="0" err="1">
-                <a:ln>
-                  <a:noFill/>
-                </a:ln>
-                <a:solidFill>
-                  <a:srgbClr val="AEB5BD"/>
-                </a:solidFill>
-                <a:effectLst/>
-                <a:uLnTx/>
-                <a:uFillTx/>
-                <a:latin typeface="Courier New" panose="02070309020205020404" pitchFamily="49" charset="0"/>
-                <a:ea typeface="+mn-ea"/>
-                <a:cs typeface="Courier New" panose="02070309020205020404" pitchFamily="49" charset="0"/>
-              </a:rPr>
-              <a:t>.</a:t>
-            </a:r>
-            <a:r>
-              <a:rPr kumimoji="0" lang="en-US" altLang="en-US" sz="1400" b="0" i="1" u="none" strike="noStrike" kern="1200" cap="none" spc="0" normalizeH="0" baseline="0" noProof="0" dirty="0" err="1">
-                <a:ln>
-                  <a:noFill/>
-                </a:ln>
-                <a:solidFill>
-                  <a:srgbClr val="828EBA"/>
-                </a:solidFill>
-                <a:effectLst/>
-                <a:uLnTx/>
-                <a:uFillTx/>
-                <a:latin typeface="Courier New" panose="02070309020205020404" pitchFamily="49" charset="0"/>
-                <a:ea typeface="+mn-ea"/>
-                <a:cs typeface="Courier New" panose="02070309020205020404" pitchFamily="49" charset="0"/>
-              </a:rPr>
-              <a:t>EQUILATERAL</a:t>
-            </a:r>
-            <a:r>
-              <a:rPr kumimoji="0" lang="en-US" altLang="en-US" sz="1400" b="0" i="0" u="none" strike="noStrike" kern="1200" cap="none" spc="0" normalizeH="0" baseline="0" noProof="0" dirty="0">
-                <a:ln>
-                  <a:noFill/>
-                </a:ln>
-                <a:solidFill>
-                  <a:srgbClr val="597CC2"/>
-                </a:solidFill>
-                <a:effectLst/>
-                <a:uLnTx/>
-                <a:uFillTx/>
-                <a:latin typeface="Courier New" panose="02070309020205020404" pitchFamily="49" charset="0"/>
-                <a:ea typeface="+mn-ea"/>
-                <a:cs typeface="Courier New" panose="02070309020205020404" pitchFamily="49" charset="0"/>
-              </a:rPr>
-              <a:t>;</a:t>
-            </a:r>
-            <a:br>
-              <a:rPr kumimoji="0" lang="en-US" altLang="en-US" sz="1400" b="0" i="0" u="none" strike="noStrike" kern="1200" cap="none" spc="0" normalizeH="0" baseline="0" noProof="0" dirty="0">
-                <a:ln>
-                  <a:noFill/>
-                </a:ln>
-                <a:solidFill>
-                  <a:srgbClr val="597CC2"/>
-                </a:solidFill>
-                <a:effectLst/>
-                <a:uLnTx/>
-                <a:uFillTx/>
-                <a:latin typeface="Courier New" panose="02070309020205020404" pitchFamily="49" charset="0"/>
-                <a:ea typeface="+mn-ea"/>
-                <a:cs typeface="Courier New" panose="02070309020205020404" pitchFamily="49" charset="0"/>
-              </a:rPr>
-            </a:br>
-            <a:r>
-              <a:rPr kumimoji="0" lang="en-US" altLang="en-US" sz="1400" b="0" i="0" u="none" strike="noStrike" kern="1200" cap="none" spc="0" normalizeH="0" baseline="0" noProof="0" dirty="0">
-                <a:ln>
-                  <a:noFill/>
-                </a:ln>
-                <a:solidFill>
-                  <a:srgbClr val="597CC2"/>
-                </a:solidFill>
-                <a:effectLst/>
-                <a:uLnTx/>
-                <a:uFillTx/>
-                <a:latin typeface="Courier New" panose="02070309020205020404" pitchFamily="49" charset="0"/>
-                <a:ea typeface="+mn-ea"/>
-                <a:cs typeface="Courier New" panose="02070309020205020404" pitchFamily="49" charset="0"/>
-              </a:rPr>
-              <a:t>    </a:t>
-            </a:r>
-            <a:r>
-              <a:rPr kumimoji="0" lang="en-US" altLang="en-US" sz="1400" b="0" i="0" u="none" strike="noStrike" kern="1200" cap="none" spc="0" normalizeH="0" baseline="0" noProof="0" dirty="0">
-                <a:ln>
-                  <a:noFill/>
-                </a:ln>
-                <a:solidFill>
-                  <a:srgbClr val="AEB5BD"/>
-                </a:solidFill>
-                <a:effectLst/>
-                <a:uLnTx/>
-                <a:uFillTx/>
-                <a:latin typeface="Courier New" panose="02070309020205020404" pitchFamily="49" charset="0"/>
-                <a:ea typeface="+mn-ea"/>
-                <a:cs typeface="Courier New" panose="02070309020205020404" pitchFamily="49" charset="0"/>
-              </a:rPr>
-              <a:t>}</a:t>
-            </a:r>
-            <a:br>
-              <a:rPr kumimoji="0" lang="en-US" altLang="en-US" sz="1400" b="0" i="0" u="none" strike="noStrike" kern="1200" cap="none" spc="0" normalizeH="0" baseline="0" noProof="0" dirty="0">
-                <a:ln>
-                  <a:noFill/>
-                </a:ln>
-                <a:solidFill>
-                  <a:srgbClr val="AEB5BD"/>
-                </a:solidFill>
-                <a:effectLst/>
-                <a:uLnTx/>
-                <a:uFillTx/>
-                <a:latin typeface="Courier New" panose="02070309020205020404" pitchFamily="49" charset="0"/>
-                <a:ea typeface="+mn-ea"/>
-                <a:cs typeface="Courier New" panose="02070309020205020404" pitchFamily="49" charset="0"/>
-              </a:rPr>
-            </a:br>
-            <a:r>
-              <a:rPr kumimoji="0" lang="en-US" altLang="en-US" sz="1400" b="0" i="0" u="none" strike="noStrike" kern="1200" cap="none" spc="0" normalizeH="0" baseline="0" noProof="0" dirty="0">
-                <a:ln>
-                  <a:noFill/>
-                </a:ln>
-                <a:solidFill>
-                  <a:srgbClr val="AEB5BD"/>
-                </a:solidFill>
-                <a:effectLst/>
-                <a:uLnTx/>
-                <a:uFillTx/>
-                <a:latin typeface="Courier New" panose="02070309020205020404" pitchFamily="49" charset="0"/>
-                <a:ea typeface="+mn-ea"/>
-                <a:cs typeface="Courier New" panose="02070309020205020404" pitchFamily="49" charset="0"/>
-              </a:rPr>
-              <a:t/>
-            </a:r>
-            <a:br>
-              <a:rPr kumimoji="0" lang="en-US" altLang="en-US" sz="1400" b="0" i="0" u="none" strike="noStrike" kern="1200" cap="none" spc="0" normalizeH="0" baseline="0" noProof="0" dirty="0">
-                <a:ln>
-                  <a:noFill/>
-                </a:ln>
-                <a:solidFill>
-                  <a:srgbClr val="AEB5BD"/>
-                </a:solidFill>
-                <a:effectLst/>
-                <a:uLnTx/>
-                <a:uFillTx/>
-                <a:latin typeface="Courier New" panose="02070309020205020404" pitchFamily="49" charset="0"/>
-                <a:ea typeface="+mn-ea"/>
-                <a:cs typeface="Courier New" panose="02070309020205020404" pitchFamily="49" charset="0"/>
-              </a:rPr>
-            </a:br>
-            <a:r>
-              <a:rPr kumimoji="0" lang="en-US" altLang="en-US" sz="1400" b="0" i="0" u="none" strike="noStrike" kern="1200" cap="none" spc="0" normalizeH="0" baseline="0" noProof="0" dirty="0">
-                <a:ln>
-                  <a:noFill/>
-                </a:ln>
-                <a:solidFill>
-                  <a:srgbClr val="AEB5BD"/>
-                </a:solidFill>
-                <a:effectLst/>
-                <a:uLnTx/>
-                <a:uFillTx/>
-                <a:latin typeface="Courier New" panose="02070309020205020404" pitchFamily="49" charset="0"/>
-                <a:ea typeface="+mn-ea"/>
-                <a:cs typeface="Courier New" panose="02070309020205020404" pitchFamily="49" charset="0"/>
-              </a:rPr>
-              <a:t>    </a:t>
-            </a:r>
-            <a:r>
-              <a:rPr kumimoji="0" lang="en-US" altLang="en-US" sz="1400" b="0" i="0" u="none" strike="noStrike" kern="1200" cap="none" spc="0" normalizeH="0" baseline="0" noProof="0" dirty="0" err="1">
-                <a:ln>
-                  <a:noFill/>
-                </a:ln>
-                <a:solidFill>
-                  <a:srgbClr val="597CC2"/>
-                </a:solidFill>
-                <a:effectLst/>
-                <a:uLnTx/>
-                <a:uFillTx/>
-                <a:latin typeface="Courier New" panose="02070309020205020404" pitchFamily="49" charset="0"/>
-                <a:ea typeface="+mn-ea"/>
-                <a:cs typeface="Courier New" panose="02070309020205020404" pitchFamily="49" charset="0"/>
-              </a:rPr>
-              <a:t>int</a:t>
-            </a:r>
-            <a:r>
-              <a:rPr kumimoji="0" lang="en-US" altLang="en-US" sz="1400" b="0" i="0" u="none" strike="noStrike" kern="1200" cap="none" spc="0" normalizeH="0" baseline="0" noProof="0" dirty="0">
-                <a:ln>
-                  <a:noFill/>
-                </a:ln>
-                <a:solidFill>
-                  <a:srgbClr val="597CC2"/>
-                </a:solidFill>
-                <a:effectLst/>
-                <a:uLnTx/>
-                <a:uFillTx/>
-                <a:latin typeface="Courier New" panose="02070309020205020404" pitchFamily="49" charset="0"/>
-                <a:ea typeface="+mn-ea"/>
-                <a:cs typeface="Courier New" panose="02070309020205020404" pitchFamily="49" charset="0"/>
-              </a:rPr>
-              <a:t> </a:t>
-            </a:r>
-            <a:r>
-              <a:rPr kumimoji="0" lang="en-US" altLang="en-US" sz="1400" b="0" i="0" u="none" strike="noStrike" kern="1200" cap="none" spc="0" normalizeH="0" baseline="0" noProof="0" dirty="0">
-                <a:ln>
-                  <a:noFill/>
-                </a:ln>
-                <a:solidFill>
-                  <a:srgbClr val="A9B7C6"/>
-                </a:solidFill>
-                <a:effectLst/>
-                <a:uLnTx/>
-                <a:uFillTx/>
-                <a:latin typeface="Courier New" panose="02070309020205020404" pitchFamily="49" charset="0"/>
-                <a:ea typeface="+mn-ea"/>
-                <a:cs typeface="Courier New" panose="02070309020205020404" pitchFamily="49" charset="0"/>
-              </a:rPr>
-              <a:t>max </a:t>
-            </a:r>
-            <a:r>
-              <a:rPr kumimoji="0" lang="en-US" altLang="en-US" sz="1400" b="0" i="0" u="none" strike="noStrike" kern="1200" cap="none" spc="0" normalizeH="0" baseline="0" noProof="0" dirty="0">
-                <a:ln>
-                  <a:noFill/>
-                </a:ln>
-                <a:solidFill>
-                  <a:srgbClr val="AEB5BD"/>
-                </a:solidFill>
-                <a:effectLst/>
-                <a:uLnTx/>
-                <a:uFillTx/>
-                <a:latin typeface="Courier New" panose="02070309020205020404" pitchFamily="49" charset="0"/>
-                <a:ea typeface="+mn-ea"/>
-                <a:cs typeface="Courier New" panose="02070309020205020404" pitchFamily="49" charset="0"/>
-              </a:rPr>
-              <a:t>= </a:t>
-            </a:r>
-            <a:r>
-              <a:rPr kumimoji="0" lang="en-US" altLang="en-US" sz="1400" b="0" i="0" u="none" strike="noStrike" kern="1200" cap="none" spc="0" normalizeH="0" baseline="0" noProof="0" dirty="0" err="1">
-                <a:ln>
-                  <a:noFill/>
-                </a:ln>
-                <a:solidFill>
-                  <a:srgbClr val="A9B7C6"/>
-                </a:solidFill>
-                <a:effectLst/>
-                <a:uLnTx/>
-                <a:uFillTx/>
-                <a:latin typeface="Courier New" panose="02070309020205020404" pitchFamily="49" charset="0"/>
-                <a:ea typeface="+mn-ea"/>
-                <a:cs typeface="Courier New" panose="02070309020205020404" pitchFamily="49" charset="0"/>
-              </a:rPr>
-              <a:t>Math</a:t>
-            </a:r>
-            <a:r>
-              <a:rPr kumimoji="0" lang="en-US" altLang="en-US" sz="1400" b="0" i="0" u="none" strike="noStrike" kern="1200" cap="none" spc="0" normalizeH="0" baseline="0" noProof="0" dirty="0" err="1">
-                <a:ln>
-                  <a:noFill/>
-                </a:ln>
-                <a:solidFill>
-                  <a:srgbClr val="AEB5BD"/>
-                </a:solidFill>
-                <a:effectLst/>
-                <a:uLnTx/>
-                <a:uFillTx/>
-                <a:latin typeface="Courier New" panose="02070309020205020404" pitchFamily="49" charset="0"/>
-                <a:ea typeface="+mn-ea"/>
-                <a:cs typeface="Courier New" panose="02070309020205020404" pitchFamily="49" charset="0"/>
-              </a:rPr>
-              <a:t>.</a:t>
-            </a:r>
-            <a:r>
-              <a:rPr kumimoji="0" lang="en-US" altLang="en-US" sz="1400" b="0" i="1" u="none" strike="noStrike" kern="1200" cap="none" spc="0" normalizeH="0" baseline="0" noProof="0" dirty="0" err="1">
-                <a:ln>
-                  <a:noFill/>
-                </a:ln>
-                <a:solidFill>
-                  <a:srgbClr val="AEB5BD"/>
-                </a:solidFill>
-                <a:effectLst/>
-                <a:uLnTx/>
-                <a:uFillTx/>
-                <a:latin typeface="Courier New" panose="02070309020205020404" pitchFamily="49" charset="0"/>
-                <a:ea typeface="+mn-ea"/>
-                <a:cs typeface="Courier New" panose="02070309020205020404" pitchFamily="49" charset="0"/>
-              </a:rPr>
-              <a:t>max</a:t>
-            </a:r>
-            <a:r>
-              <a:rPr kumimoji="0" lang="en-US" altLang="en-US" sz="1400" b="0" i="0" u="none" strike="noStrike" kern="1200" cap="none" spc="0" normalizeH="0" baseline="0" noProof="0" dirty="0">
-                <a:ln>
-                  <a:noFill/>
-                </a:ln>
-                <a:solidFill>
-                  <a:srgbClr val="AEB5BD"/>
-                </a:solidFill>
-                <a:effectLst/>
-                <a:uLnTx/>
-                <a:uFillTx/>
-                <a:latin typeface="Courier New" panose="02070309020205020404" pitchFamily="49" charset="0"/>
-                <a:ea typeface="+mn-ea"/>
-                <a:cs typeface="Courier New" panose="02070309020205020404" pitchFamily="49" charset="0"/>
-              </a:rPr>
-              <a:t>(</a:t>
-            </a:r>
-            <a:r>
-              <a:rPr kumimoji="0" lang="en-US" altLang="en-US" sz="1400" b="0" i="0" u="none" strike="noStrike" kern="1200" cap="none" spc="0" normalizeH="0" baseline="0" noProof="0" dirty="0">
-                <a:ln>
-                  <a:noFill/>
-                </a:ln>
-                <a:solidFill>
-                  <a:srgbClr val="A9B7C6"/>
-                </a:solidFill>
-                <a:effectLst/>
-                <a:uLnTx/>
-                <a:uFillTx/>
-                <a:latin typeface="Courier New" panose="02070309020205020404" pitchFamily="49" charset="0"/>
-                <a:ea typeface="+mn-ea"/>
-                <a:cs typeface="Courier New" panose="02070309020205020404" pitchFamily="49" charset="0"/>
-              </a:rPr>
-              <a:t>a</a:t>
-            </a:r>
-            <a:r>
-              <a:rPr kumimoji="0" lang="en-US" altLang="en-US" sz="1400" b="0" i="0" u="none" strike="noStrike" kern="1200" cap="none" spc="0" normalizeH="0" baseline="0" noProof="0" dirty="0">
-                <a:ln>
-                  <a:noFill/>
-                </a:ln>
-                <a:solidFill>
-                  <a:srgbClr val="5C7AB8"/>
-                </a:solidFill>
-                <a:effectLst/>
-                <a:uLnTx/>
-                <a:uFillTx/>
-                <a:latin typeface="Courier New" panose="02070309020205020404" pitchFamily="49" charset="0"/>
-                <a:ea typeface="+mn-ea"/>
-                <a:cs typeface="Courier New" panose="02070309020205020404" pitchFamily="49" charset="0"/>
-              </a:rPr>
-              <a:t>, </a:t>
-            </a:r>
-            <a:r>
-              <a:rPr kumimoji="0" lang="en-US" altLang="en-US" sz="1400" b="0" i="0" u="none" strike="noStrike" kern="1200" cap="none" spc="0" normalizeH="0" baseline="0" noProof="0" dirty="0" err="1">
-                <a:ln>
-                  <a:noFill/>
-                </a:ln>
-                <a:solidFill>
-                  <a:srgbClr val="A9B7C6"/>
-                </a:solidFill>
-                <a:effectLst/>
-                <a:uLnTx/>
-                <a:uFillTx/>
-                <a:latin typeface="Courier New" panose="02070309020205020404" pitchFamily="49" charset="0"/>
-                <a:ea typeface="+mn-ea"/>
-                <a:cs typeface="Courier New" panose="02070309020205020404" pitchFamily="49" charset="0"/>
-              </a:rPr>
-              <a:t>Math</a:t>
-            </a:r>
-            <a:r>
-              <a:rPr kumimoji="0" lang="en-US" altLang="en-US" sz="1400" b="0" i="0" u="none" strike="noStrike" kern="1200" cap="none" spc="0" normalizeH="0" baseline="0" noProof="0" dirty="0" err="1">
-                <a:ln>
-                  <a:noFill/>
-                </a:ln>
-                <a:solidFill>
-                  <a:srgbClr val="AEB5BD"/>
-                </a:solidFill>
-                <a:effectLst/>
-                <a:uLnTx/>
-                <a:uFillTx/>
-                <a:latin typeface="Courier New" panose="02070309020205020404" pitchFamily="49" charset="0"/>
-                <a:ea typeface="+mn-ea"/>
-                <a:cs typeface="Courier New" panose="02070309020205020404" pitchFamily="49" charset="0"/>
-              </a:rPr>
-              <a:t>.</a:t>
-            </a:r>
-            <a:r>
-              <a:rPr kumimoji="0" lang="en-US" altLang="en-US" sz="1400" b="0" i="1" u="none" strike="noStrike" kern="1200" cap="none" spc="0" normalizeH="0" baseline="0" noProof="0" dirty="0" err="1">
-                <a:ln>
-                  <a:noFill/>
-                </a:ln>
-                <a:solidFill>
-                  <a:srgbClr val="AEB5BD"/>
-                </a:solidFill>
-                <a:effectLst/>
-                <a:uLnTx/>
-                <a:uFillTx/>
-                <a:latin typeface="Courier New" panose="02070309020205020404" pitchFamily="49" charset="0"/>
-                <a:ea typeface="+mn-ea"/>
-                <a:cs typeface="Courier New" panose="02070309020205020404" pitchFamily="49" charset="0"/>
-              </a:rPr>
-              <a:t>max</a:t>
-            </a:r>
-            <a:r>
-              <a:rPr kumimoji="0" lang="en-US" altLang="en-US" sz="1400" b="0" i="0" u="none" strike="noStrike" kern="1200" cap="none" spc="0" normalizeH="0" baseline="0" noProof="0" dirty="0">
-                <a:ln>
-                  <a:noFill/>
-                </a:ln>
-                <a:solidFill>
-                  <a:srgbClr val="AEB5BD"/>
-                </a:solidFill>
-                <a:effectLst/>
-                <a:uLnTx/>
-                <a:uFillTx/>
-                <a:latin typeface="Courier New" panose="02070309020205020404" pitchFamily="49" charset="0"/>
-                <a:ea typeface="+mn-ea"/>
-                <a:cs typeface="Courier New" panose="02070309020205020404" pitchFamily="49" charset="0"/>
-              </a:rPr>
-              <a:t>(</a:t>
-            </a:r>
-            <a:r>
-              <a:rPr kumimoji="0" lang="en-US" altLang="en-US" sz="1400" b="0" i="0" u="none" strike="noStrike" kern="1200" cap="none" spc="0" normalizeH="0" baseline="0" noProof="0" dirty="0" err="1">
-                <a:ln>
-                  <a:noFill/>
-                </a:ln>
-                <a:solidFill>
-                  <a:srgbClr val="A9B7C6"/>
-                </a:solidFill>
-                <a:effectLst/>
-                <a:uLnTx/>
-                <a:uFillTx/>
-                <a:latin typeface="Courier New" panose="02070309020205020404" pitchFamily="49" charset="0"/>
-                <a:ea typeface="+mn-ea"/>
-                <a:cs typeface="Courier New" panose="02070309020205020404" pitchFamily="49" charset="0"/>
-              </a:rPr>
-              <a:t>b</a:t>
-            </a:r>
-            <a:r>
-              <a:rPr kumimoji="0" lang="en-US" altLang="en-US" sz="1400" b="0" i="0" u="none" strike="noStrike" kern="1200" cap="none" spc="0" normalizeH="0" baseline="0" noProof="0" dirty="0" err="1">
-                <a:ln>
-                  <a:noFill/>
-                </a:ln>
-                <a:solidFill>
-                  <a:srgbClr val="5C7AB8"/>
-                </a:solidFill>
-                <a:effectLst/>
-                <a:uLnTx/>
-                <a:uFillTx/>
-                <a:latin typeface="Courier New" panose="02070309020205020404" pitchFamily="49" charset="0"/>
-                <a:ea typeface="+mn-ea"/>
-                <a:cs typeface="Courier New" panose="02070309020205020404" pitchFamily="49" charset="0"/>
-              </a:rPr>
-              <a:t>,</a:t>
-            </a:r>
-            <a:r>
-              <a:rPr kumimoji="0" lang="en-US" altLang="en-US" sz="1400" b="0" i="0" u="none" strike="noStrike" kern="1200" cap="none" spc="0" normalizeH="0" baseline="0" noProof="0" dirty="0" err="1">
-                <a:ln>
-                  <a:noFill/>
-                </a:ln>
-                <a:solidFill>
-                  <a:srgbClr val="A9B7C6"/>
-                </a:solidFill>
-                <a:effectLst/>
-                <a:uLnTx/>
-                <a:uFillTx/>
-                <a:latin typeface="Courier New" panose="02070309020205020404" pitchFamily="49" charset="0"/>
-                <a:ea typeface="+mn-ea"/>
-                <a:cs typeface="Courier New" panose="02070309020205020404" pitchFamily="49" charset="0"/>
-              </a:rPr>
-              <a:t>c</a:t>
-            </a:r>
-            <a:r>
-              <a:rPr kumimoji="0" lang="en-US" altLang="en-US" sz="1400" b="0" i="0" u="none" strike="noStrike" kern="1200" cap="none" spc="0" normalizeH="0" baseline="0" noProof="0" dirty="0">
-                <a:ln>
-                  <a:noFill/>
-                </a:ln>
-                <a:solidFill>
-                  <a:srgbClr val="AEB5BD"/>
-                </a:solidFill>
-                <a:effectLst/>
-                <a:uLnTx/>
-                <a:uFillTx/>
-                <a:latin typeface="Courier New" panose="02070309020205020404" pitchFamily="49" charset="0"/>
-                <a:ea typeface="+mn-ea"/>
-                <a:cs typeface="Courier New" panose="02070309020205020404" pitchFamily="49" charset="0"/>
-              </a:rPr>
-              <a:t>))</a:t>
-            </a:r>
-            <a:r>
-              <a:rPr kumimoji="0" lang="en-US" altLang="en-US" sz="1400" b="0" i="0" u="none" strike="noStrike" kern="1200" cap="none" spc="0" normalizeH="0" baseline="0" noProof="0" dirty="0">
-                <a:ln>
-                  <a:noFill/>
-                </a:ln>
-                <a:solidFill>
-                  <a:srgbClr val="597CC2"/>
-                </a:solidFill>
-                <a:effectLst/>
-                <a:uLnTx/>
-                <a:uFillTx/>
-                <a:latin typeface="Courier New" panose="02070309020205020404" pitchFamily="49" charset="0"/>
-                <a:ea typeface="+mn-ea"/>
-                <a:cs typeface="Courier New" panose="02070309020205020404" pitchFamily="49" charset="0"/>
-              </a:rPr>
-              <a:t>;</a:t>
-            </a:r>
-            <a:br>
-              <a:rPr kumimoji="0" lang="en-US" altLang="en-US" sz="1400" b="0" i="0" u="none" strike="noStrike" kern="1200" cap="none" spc="0" normalizeH="0" baseline="0" noProof="0" dirty="0">
-                <a:ln>
-                  <a:noFill/>
-                </a:ln>
-                <a:solidFill>
-                  <a:srgbClr val="597CC2"/>
-                </a:solidFill>
-                <a:effectLst/>
-                <a:uLnTx/>
-                <a:uFillTx/>
-                <a:latin typeface="Courier New" panose="02070309020205020404" pitchFamily="49" charset="0"/>
-                <a:ea typeface="+mn-ea"/>
-                <a:cs typeface="Courier New" panose="02070309020205020404" pitchFamily="49" charset="0"/>
-              </a:rPr>
-            </a:br>
-            <a:r>
-              <a:rPr kumimoji="0" lang="en-US" altLang="en-US" sz="1400" b="0" i="0" u="none" strike="noStrike" kern="1200" cap="none" spc="0" normalizeH="0" baseline="0" noProof="0" dirty="0">
-                <a:ln>
-                  <a:noFill/>
-                </a:ln>
-                <a:solidFill>
-                  <a:srgbClr val="597CC2"/>
-                </a:solidFill>
-                <a:effectLst/>
-                <a:uLnTx/>
-                <a:uFillTx/>
-                <a:latin typeface="Courier New" panose="02070309020205020404" pitchFamily="49" charset="0"/>
-                <a:ea typeface="+mn-ea"/>
-                <a:cs typeface="Courier New" panose="02070309020205020404" pitchFamily="49" charset="0"/>
-              </a:rPr>
-              <a:t/>
-            </a:r>
-            <a:br>
-              <a:rPr kumimoji="0" lang="en-US" altLang="en-US" sz="1400" b="0" i="0" u="none" strike="noStrike" kern="1200" cap="none" spc="0" normalizeH="0" baseline="0" noProof="0" dirty="0">
-                <a:ln>
-                  <a:noFill/>
-                </a:ln>
-                <a:solidFill>
-                  <a:srgbClr val="597CC2"/>
-                </a:solidFill>
-                <a:effectLst/>
-                <a:uLnTx/>
-                <a:uFillTx/>
-                <a:latin typeface="Courier New" panose="02070309020205020404" pitchFamily="49" charset="0"/>
-                <a:ea typeface="+mn-ea"/>
-                <a:cs typeface="Courier New" panose="02070309020205020404" pitchFamily="49" charset="0"/>
-              </a:rPr>
-            </a:br>
-            <a:r>
-              <a:rPr kumimoji="0" lang="en-US" altLang="en-US" sz="1400" b="0" i="0" u="none" strike="noStrike" kern="1200" cap="none" spc="0" normalizeH="0" baseline="0" noProof="0" dirty="0">
-                <a:ln>
-                  <a:noFill/>
-                </a:ln>
-                <a:solidFill>
-                  <a:srgbClr val="597CC2"/>
-                </a:solidFill>
-                <a:effectLst/>
-                <a:uLnTx/>
-                <a:uFillTx/>
-                <a:latin typeface="Courier New" panose="02070309020205020404" pitchFamily="49" charset="0"/>
-                <a:ea typeface="+mn-ea"/>
-                <a:cs typeface="Courier New" panose="02070309020205020404" pitchFamily="49" charset="0"/>
-              </a:rPr>
-              <a:t>    if</a:t>
-            </a:r>
-            <a:r>
-              <a:rPr kumimoji="0" lang="en-US" altLang="en-US" sz="1400" b="0" i="0" u="none" strike="noStrike" kern="1200" cap="none" spc="0" normalizeH="0" baseline="0" noProof="0" dirty="0">
-                <a:ln>
-                  <a:noFill/>
-                </a:ln>
-                <a:solidFill>
-                  <a:srgbClr val="AEB5BD"/>
-                </a:solidFill>
-                <a:effectLst/>
-                <a:uLnTx/>
-                <a:uFillTx/>
-                <a:latin typeface="Courier New" panose="02070309020205020404" pitchFamily="49" charset="0"/>
-                <a:ea typeface="+mn-ea"/>
-                <a:cs typeface="Courier New" panose="02070309020205020404" pitchFamily="49" charset="0"/>
-              </a:rPr>
-              <a:t>( (</a:t>
-            </a:r>
-            <a:r>
-              <a:rPr kumimoji="0" lang="en-US" altLang="en-US" sz="1400" b="0" i="0" u="none" strike="noStrike" kern="1200" cap="none" spc="0" normalizeH="0" baseline="0" noProof="0" dirty="0">
-                <a:ln>
-                  <a:noFill/>
-                </a:ln>
-                <a:solidFill>
-                  <a:srgbClr val="A9B7C6"/>
-                </a:solidFill>
-                <a:effectLst/>
-                <a:uLnTx/>
-                <a:uFillTx/>
-                <a:latin typeface="Courier New" panose="02070309020205020404" pitchFamily="49" charset="0"/>
-                <a:ea typeface="+mn-ea"/>
-                <a:cs typeface="Courier New" panose="02070309020205020404" pitchFamily="49" charset="0"/>
-              </a:rPr>
-              <a:t>max </a:t>
-            </a:r>
-            <a:r>
-              <a:rPr kumimoji="0" lang="en-US" altLang="en-US" sz="1400" b="0" i="0" u="none" strike="noStrike" kern="1200" cap="none" spc="0" normalizeH="0" baseline="0" noProof="0" dirty="0">
-                <a:ln>
-                  <a:noFill/>
-                </a:ln>
-                <a:solidFill>
-                  <a:srgbClr val="AEB5BD"/>
-                </a:solidFill>
-                <a:effectLst/>
-                <a:uLnTx/>
-                <a:uFillTx/>
-                <a:latin typeface="Courier New" panose="02070309020205020404" pitchFamily="49" charset="0"/>
-                <a:ea typeface="+mn-ea"/>
-                <a:cs typeface="Courier New" panose="02070309020205020404" pitchFamily="49" charset="0"/>
-              </a:rPr>
-              <a:t>== </a:t>
-            </a:r>
-            <a:r>
-              <a:rPr kumimoji="0" lang="en-US" altLang="en-US" sz="1400" b="0" i="0" u="none" strike="noStrike" kern="1200" cap="none" spc="0" normalizeH="0" baseline="0" noProof="0" dirty="0">
-                <a:ln>
-                  <a:noFill/>
-                </a:ln>
-                <a:solidFill>
-                  <a:srgbClr val="A9B7C6"/>
-                </a:solidFill>
-                <a:effectLst/>
-                <a:uLnTx/>
-                <a:uFillTx/>
-                <a:latin typeface="Courier New" panose="02070309020205020404" pitchFamily="49" charset="0"/>
-                <a:ea typeface="+mn-ea"/>
-                <a:cs typeface="Courier New" panose="02070309020205020404" pitchFamily="49" charset="0"/>
-              </a:rPr>
-              <a:t>a </a:t>
-            </a:r>
-            <a:r>
-              <a:rPr kumimoji="0" lang="en-US" altLang="en-US" sz="1400" b="0" i="0" u="none" strike="noStrike" kern="1200" cap="none" spc="0" normalizeH="0" baseline="0" noProof="0" dirty="0">
-                <a:ln>
-                  <a:noFill/>
-                </a:ln>
-                <a:solidFill>
-                  <a:srgbClr val="AEB5BD"/>
-                </a:solidFill>
-                <a:effectLst/>
-                <a:uLnTx/>
-                <a:uFillTx/>
-                <a:latin typeface="Courier New" panose="02070309020205020404" pitchFamily="49" charset="0"/>
-                <a:ea typeface="+mn-ea"/>
-                <a:cs typeface="Courier New" panose="02070309020205020404" pitchFamily="49" charset="0"/>
-              </a:rPr>
-              <a:t>&amp;&amp; </a:t>
-            </a:r>
-            <a:r>
-              <a:rPr kumimoji="0" lang="en-US" altLang="en-US" sz="1400" b="0" i="0" u="none" strike="noStrike" kern="1200" cap="none" spc="0" normalizeH="0" baseline="0" noProof="0" dirty="0">
-                <a:ln>
-                  <a:noFill/>
-                </a:ln>
-                <a:solidFill>
-                  <a:srgbClr val="A9B7C6"/>
-                </a:solidFill>
-                <a:effectLst/>
-                <a:uLnTx/>
-                <a:uFillTx/>
-                <a:latin typeface="Courier New" panose="02070309020205020404" pitchFamily="49" charset="0"/>
-                <a:ea typeface="+mn-ea"/>
-                <a:cs typeface="Courier New" panose="02070309020205020404" pitchFamily="49" charset="0"/>
-              </a:rPr>
-              <a:t>max </a:t>
-            </a:r>
-            <a:r>
-              <a:rPr kumimoji="0" lang="en-US" altLang="en-US" sz="1400" b="0" i="0" u="none" strike="noStrike" kern="1200" cap="none" spc="0" normalizeH="0" baseline="0" noProof="0" dirty="0">
-                <a:ln>
-                  <a:noFill/>
-                </a:ln>
-                <a:solidFill>
-                  <a:srgbClr val="AEB5BD"/>
-                </a:solidFill>
-                <a:effectLst/>
-                <a:uLnTx/>
-                <a:uFillTx/>
-                <a:latin typeface="Courier New" panose="02070309020205020404" pitchFamily="49" charset="0"/>
-                <a:ea typeface="+mn-ea"/>
-                <a:cs typeface="Courier New" panose="02070309020205020404" pitchFamily="49" charset="0"/>
-              </a:rPr>
-              <a:t>-</a:t>
-            </a:r>
-            <a:r>
-              <a:rPr kumimoji="0" lang="en-US" altLang="en-US" sz="1400" b="0" i="0" u="none" strike="noStrike" kern="1200" cap="none" spc="0" normalizeH="0" baseline="0" noProof="0" dirty="0">
-                <a:ln>
-                  <a:noFill/>
-                </a:ln>
-                <a:solidFill>
-                  <a:srgbClr val="A9B7C6"/>
-                </a:solidFill>
-                <a:effectLst/>
-                <a:uLnTx/>
-                <a:uFillTx/>
-                <a:latin typeface="Courier New" panose="02070309020205020404" pitchFamily="49" charset="0"/>
-                <a:ea typeface="+mn-ea"/>
-                <a:cs typeface="Courier New" panose="02070309020205020404" pitchFamily="49" charset="0"/>
-              </a:rPr>
-              <a:t>b </a:t>
-            </a:r>
-            <a:r>
-              <a:rPr kumimoji="0" lang="en-US" altLang="en-US" sz="1400" b="0" i="0" u="none" strike="noStrike" kern="1200" cap="none" spc="0" normalizeH="0" baseline="0" noProof="0" dirty="0">
-                <a:ln>
-                  <a:noFill/>
-                </a:ln>
-                <a:solidFill>
-                  <a:srgbClr val="AEB5BD"/>
-                </a:solidFill>
-                <a:effectLst/>
-                <a:uLnTx/>
-                <a:uFillTx/>
-                <a:latin typeface="Courier New" panose="02070309020205020404" pitchFamily="49" charset="0"/>
-                <a:ea typeface="+mn-ea"/>
-                <a:cs typeface="Courier New" panose="02070309020205020404" pitchFamily="49" charset="0"/>
-              </a:rPr>
-              <a:t>-</a:t>
-            </a:r>
-            <a:r>
-              <a:rPr kumimoji="0" lang="en-US" altLang="en-US" sz="1400" b="0" i="0" u="none" strike="noStrike" kern="1200" cap="none" spc="0" normalizeH="0" baseline="0" noProof="0" dirty="0">
-                <a:ln>
-                  <a:noFill/>
-                </a:ln>
-                <a:solidFill>
-                  <a:srgbClr val="A9B7C6"/>
-                </a:solidFill>
-                <a:effectLst/>
-                <a:uLnTx/>
-                <a:uFillTx/>
-                <a:latin typeface="Courier New" panose="02070309020205020404" pitchFamily="49" charset="0"/>
-                <a:ea typeface="+mn-ea"/>
-                <a:cs typeface="Courier New" panose="02070309020205020404" pitchFamily="49" charset="0"/>
-              </a:rPr>
-              <a:t>c </a:t>
-            </a:r>
-            <a:r>
-              <a:rPr kumimoji="0" lang="en-US" altLang="en-US" sz="1400" b="0" i="0" u="none" strike="noStrike" kern="1200" cap="none" spc="0" normalizeH="0" baseline="0" noProof="0" dirty="0">
-                <a:ln>
-                  <a:noFill/>
-                </a:ln>
-                <a:solidFill>
-                  <a:srgbClr val="AEB5BD"/>
-                </a:solidFill>
-                <a:effectLst/>
-                <a:uLnTx/>
-                <a:uFillTx/>
-                <a:latin typeface="Courier New" panose="02070309020205020404" pitchFamily="49" charset="0"/>
-                <a:ea typeface="+mn-ea"/>
-                <a:cs typeface="Courier New" panose="02070309020205020404" pitchFamily="49" charset="0"/>
-              </a:rPr>
-              <a:t>&gt;= </a:t>
-            </a:r>
-            <a:r>
-              <a:rPr kumimoji="0" lang="en-US" altLang="en-US" sz="1400" b="0" i="0" u="none" strike="noStrike" kern="1200" cap="none" spc="0" normalizeH="0" baseline="0" noProof="0" dirty="0">
-                <a:ln>
-                  <a:noFill/>
-                </a:ln>
-                <a:solidFill>
-                  <a:srgbClr val="267DFF"/>
-                </a:solidFill>
-                <a:effectLst/>
-                <a:uLnTx/>
-                <a:uFillTx/>
-                <a:latin typeface="Courier New" panose="02070309020205020404" pitchFamily="49" charset="0"/>
-                <a:ea typeface="+mn-ea"/>
-                <a:cs typeface="Courier New" panose="02070309020205020404" pitchFamily="49" charset="0"/>
-              </a:rPr>
-              <a:t>0 </a:t>
-            </a:r>
-            <a:r>
-              <a:rPr kumimoji="0" lang="en-US" altLang="en-US" sz="1400" b="0" i="0" u="none" strike="noStrike" kern="1200" cap="none" spc="0" normalizeH="0" baseline="0" noProof="0" dirty="0">
-                <a:ln>
-                  <a:noFill/>
-                </a:ln>
-                <a:solidFill>
-                  <a:srgbClr val="AEB5BD"/>
-                </a:solidFill>
-                <a:effectLst/>
-                <a:uLnTx/>
-                <a:uFillTx/>
-                <a:latin typeface="Courier New" panose="02070309020205020404" pitchFamily="49" charset="0"/>
-                <a:ea typeface="+mn-ea"/>
-                <a:cs typeface="Courier New" panose="02070309020205020404" pitchFamily="49" charset="0"/>
-              </a:rPr>
-              <a:t>) ||</a:t>
-            </a:r>
-            <a:br>
-              <a:rPr kumimoji="0" lang="en-US" altLang="en-US" sz="1400" b="0" i="0" u="none" strike="noStrike" kern="1200" cap="none" spc="0" normalizeH="0" baseline="0" noProof="0" dirty="0">
-                <a:ln>
-                  <a:noFill/>
-                </a:ln>
-                <a:solidFill>
-                  <a:srgbClr val="AEB5BD"/>
-                </a:solidFill>
-                <a:effectLst/>
-                <a:uLnTx/>
-                <a:uFillTx/>
-                <a:latin typeface="Courier New" panose="02070309020205020404" pitchFamily="49" charset="0"/>
-                <a:ea typeface="+mn-ea"/>
-                <a:cs typeface="Courier New" panose="02070309020205020404" pitchFamily="49" charset="0"/>
-              </a:rPr>
-            </a:br>
-            <a:r>
-              <a:rPr kumimoji="0" lang="en-US" altLang="en-US" sz="1400" b="0" i="0" u="none" strike="noStrike" kern="1200" cap="none" spc="0" normalizeH="0" baseline="0" noProof="0" dirty="0">
-                <a:ln>
-                  <a:noFill/>
-                </a:ln>
-                <a:solidFill>
-                  <a:srgbClr val="AEB5BD"/>
-                </a:solidFill>
-                <a:effectLst/>
-                <a:uLnTx/>
-                <a:uFillTx/>
-                <a:latin typeface="Courier New" panose="02070309020205020404" pitchFamily="49" charset="0"/>
-                <a:ea typeface="+mn-ea"/>
-                <a:cs typeface="Courier New" panose="02070309020205020404" pitchFamily="49" charset="0"/>
-              </a:rPr>
-              <a:t>            (</a:t>
-            </a:r>
-            <a:r>
-              <a:rPr kumimoji="0" lang="en-US" altLang="en-US" sz="1400" b="0" i="0" u="none" strike="noStrike" kern="1200" cap="none" spc="0" normalizeH="0" baseline="0" noProof="0" dirty="0">
-                <a:ln>
-                  <a:noFill/>
-                </a:ln>
-                <a:solidFill>
-                  <a:srgbClr val="A9B7C6"/>
-                </a:solidFill>
-                <a:effectLst/>
-                <a:uLnTx/>
-                <a:uFillTx/>
-                <a:latin typeface="Courier New" panose="02070309020205020404" pitchFamily="49" charset="0"/>
-                <a:ea typeface="+mn-ea"/>
-                <a:cs typeface="Courier New" panose="02070309020205020404" pitchFamily="49" charset="0"/>
-              </a:rPr>
-              <a:t>max </a:t>
-            </a:r>
-            <a:r>
-              <a:rPr kumimoji="0" lang="en-US" altLang="en-US" sz="1400" b="0" i="0" u="none" strike="noStrike" kern="1200" cap="none" spc="0" normalizeH="0" baseline="0" noProof="0" dirty="0">
-                <a:ln>
-                  <a:noFill/>
-                </a:ln>
-                <a:solidFill>
-                  <a:srgbClr val="AEB5BD"/>
-                </a:solidFill>
-                <a:effectLst/>
-                <a:uLnTx/>
-                <a:uFillTx/>
-                <a:latin typeface="Courier New" panose="02070309020205020404" pitchFamily="49" charset="0"/>
-                <a:ea typeface="+mn-ea"/>
-                <a:cs typeface="Courier New" panose="02070309020205020404" pitchFamily="49" charset="0"/>
-              </a:rPr>
-              <a:t>== </a:t>
-            </a:r>
-            <a:r>
-              <a:rPr kumimoji="0" lang="en-US" altLang="en-US" sz="1400" b="0" i="0" u="none" strike="noStrike" kern="1200" cap="none" spc="0" normalizeH="0" baseline="0" noProof="0" dirty="0">
-                <a:ln>
-                  <a:noFill/>
-                </a:ln>
-                <a:solidFill>
-                  <a:srgbClr val="A9B7C6"/>
-                </a:solidFill>
-                <a:effectLst/>
-                <a:uLnTx/>
-                <a:uFillTx/>
-                <a:latin typeface="Courier New" panose="02070309020205020404" pitchFamily="49" charset="0"/>
-                <a:ea typeface="+mn-ea"/>
-                <a:cs typeface="Courier New" panose="02070309020205020404" pitchFamily="49" charset="0"/>
-              </a:rPr>
-              <a:t>b </a:t>
-            </a:r>
-            <a:r>
-              <a:rPr kumimoji="0" lang="en-US" altLang="en-US" sz="1400" b="0" i="0" u="none" strike="noStrike" kern="1200" cap="none" spc="0" normalizeH="0" baseline="0" noProof="0" dirty="0">
-                <a:ln>
-                  <a:noFill/>
-                </a:ln>
-                <a:solidFill>
-                  <a:srgbClr val="AEB5BD"/>
-                </a:solidFill>
-                <a:effectLst/>
-                <a:uLnTx/>
-                <a:uFillTx/>
-                <a:latin typeface="Courier New" panose="02070309020205020404" pitchFamily="49" charset="0"/>
-                <a:ea typeface="+mn-ea"/>
-                <a:cs typeface="Courier New" panose="02070309020205020404" pitchFamily="49" charset="0"/>
-              </a:rPr>
-              <a:t>&amp;&amp; </a:t>
-            </a:r>
-            <a:r>
-              <a:rPr kumimoji="0" lang="en-US" altLang="en-US" sz="1400" b="0" i="0" u="none" strike="noStrike" kern="1200" cap="none" spc="0" normalizeH="0" baseline="0" noProof="0" dirty="0">
-                <a:ln>
-                  <a:noFill/>
-                </a:ln>
-                <a:solidFill>
-                  <a:srgbClr val="A9B7C6"/>
-                </a:solidFill>
-                <a:effectLst/>
-                <a:uLnTx/>
-                <a:uFillTx/>
-                <a:latin typeface="Courier New" panose="02070309020205020404" pitchFamily="49" charset="0"/>
-                <a:ea typeface="+mn-ea"/>
-                <a:cs typeface="Courier New" panose="02070309020205020404" pitchFamily="49" charset="0"/>
-              </a:rPr>
-              <a:t>max </a:t>
-            </a:r>
-            <a:r>
-              <a:rPr kumimoji="0" lang="en-US" altLang="en-US" sz="1400" b="0" i="0" u="none" strike="noStrike" kern="1200" cap="none" spc="0" normalizeH="0" baseline="0" noProof="0" dirty="0">
-                <a:ln>
-                  <a:noFill/>
-                </a:ln>
-                <a:solidFill>
-                  <a:srgbClr val="AEB5BD"/>
-                </a:solidFill>
-                <a:effectLst/>
-                <a:uLnTx/>
-                <a:uFillTx/>
-                <a:latin typeface="Courier New" panose="02070309020205020404" pitchFamily="49" charset="0"/>
-                <a:ea typeface="+mn-ea"/>
-                <a:cs typeface="Courier New" panose="02070309020205020404" pitchFamily="49" charset="0"/>
-              </a:rPr>
-              <a:t>-</a:t>
-            </a:r>
-            <a:r>
-              <a:rPr kumimoji="0" lang="en-US" altLang="en-US" sz="1400" b="0" i="0" u="none" strike="noStrike" kern="1200" cap="none" spc="0" normalizeH="0" baseline="0" noProof="0" dirty="0">
-                <a:ln>
-                  <a:noFill/>
-                </a:ln>
-                <a:solidFill>
-                  <a:srgbClr val="A9B7C6"/>
-                </a:solidFill>
-                <a:effectLst/>
-                <a:uLnTx/>
-                <a:uFillTx/>
-                <a:latin typeface="Courier New" panose="02070309020205020404" pitchFamily="49" charset="0"/>
-                <a:ea typeface="+mn-ea"/>
-                <a:cs typeface="Courier New" panose="02070309020205020404" pitchFamily="49" charset="0"/>
-              </a:rPr>
-              <a:t>a </a:t>
-            </a:r>
-            <a:r>
-              <a:rPr kumimoji="0" lang="en-US" altLang="en-US" sz="1400" b="0" i="0" u="none" strike="noStrike" kern="1200" cap="none" spc="0" normalizeH="0" baseline="0" noProof="0" dirty="0">
-                <a:ln>
-                  <a:noFill/>
-                </a:ln>
-                <a:solidFill>
-                  <a:srgbClr val="AEB5BD"/>
-                </a:solidFill>
-                <a:effectLst/>
-                <a:uLnTx/>
-                <a:uFillTx/>
-                <a:latin typeface="Courier New" panose="02070309020205020404" pitchFamily="49" charset="0"/>
-                <a:ea typeface="+mn-ea"/>
-                <a:cs typeface="Courier New" panose="02070309020205020404" pitchFamily="49" charset="0"/>
-              </a:rPr>
-              <a:t>-</a:t>
-            </a:r>
-            <a:r>
-              <a:rPr kumimoji="0" lang="en-US" altLang="en-US" sz="1400" b="0" i="0" u="none" strike="noStrike" kern="1200" cap="none" spc="0" normalizeH="0" baseline="0" noProof="0" dirty="0">
-                <a:ln>
-                  <a:noFill/>
-                </a:ln>
-                <a:solidFill>
-                  <a:srgbClr val="A9B7C6"/>
-                </a:solidFill>
-                <a:effectLst/>
-                <a:uLnTx/>
-                <a:uFillTx/>
-                <a:latin typeface="Courier New" panose="02070309020205020404" pitchFamily="49" charset="0"/>
-                <a:ea typeface="+mn-ea"/>
-                <a:cs typeface="Courier New" panose="02070309020205020404" pitchFamily="49" charset="0"/>
-              </a:rPr>
-              <a:t>c </a:t>
-            </a:r>
-            <a:r>
-              <a:rPr kumimoji="0" lang="en-US" altLang="en-US" sz="1400" b="0" i="0" u="none" strike="noStrike" kern="1200" cap="none" spc="0" normalizeH="0" baseline="0" noProof="0" dirty="0">
-                <a:ln>
-                  <a:noFill/>
-                </a:ln>
-                <a:solidFill>
-                  <a:srgbClr val="AEB5BD"/>
-                </a:solidFill>
-                <a:effectLst/>
-                <a:uLnTx/>
-                <a:uFillTx/>
-                <a:latin typeface="Courier New" panose="02070309020205020404" pitchFamily="49" charset="0"/>
-                <a:ea typeface="+mn-ea"/>
-                <a:cs typeface="Courier New" panose="02070309020205020404" pitchFamily="49" charset="0"/>
-              </a:rPr>
-              <a:t>&gt;= </a:t>
-            </a:r>
-            <a:r>
-              <a:rPr kumimoji="0" lang="en-US" altLang="en-US" sz="1400" b="0" i="0" u="none" strike="noStrike" kern="1200" cap="none" spc="0" normalizeH="0" baseline="0" noProof="0" dirty="0">
-                <a:ln>
-                  <a:noFill/>
-                </a:ln>
-                <a:solidFill>
-                  <a:srgbClr val="267DFF"/>
-                </a:solidFill>
-                <a:effectLst/>
-                <a:uLnTx/>
-                <a:uFillTx/>
-                <a:latin typeface="Courier New" panose="02070309020205020404" pitchFamily="49" charset="0"/>
-                <a:ea typeface="+mn-ea"/>
-                <a:cs typeface="Courier New" panose="02070309020205020404" pitchFamily="49" charset="0"/>
-              </a:rPr>
-              <a:t>0 </a:t>
-            </a:r>
-            <a:r>
-              <a:rPr kumimoji="0" lang="en-US" altLang="en-US" sz="1400" b="0" i="0" u="none" strike="noStrike" kern="1200" cap="none" spc="0" normalizeH="0" baseline="0" noProof="0" dirty="0">
-                <a:ln>
-                  <a:noFill/>
-                </a:ln>
-                <a:solidFill>
-                  <a:srgbClr val="AEB5BD"/>
-                </a:solidFill>
-                <a:effectLst/>
-                <a:uLnTx/>
-                <a:uFillTx/>
-                <a:latin typeface="Courier New" panose="02070309020205020404" pitchFamily="49" charset="0"/>
-                <a:ea typeface="+mn-ea"/>
-                <a:cs typeface="Courier New" panose="02070309020205020404" pitchFamily="49" charset="0"/>
-              </a:rPr>
-              <a:t>) ||</a:t>
-            </a:r>
-            <a:br>
-              <a:rPr kumimoji="0" lang="en-US" altLang="en-US" sz="1400" b="0" i="0" u="none" strike="noStrike" kern="1200" cap="none" spc="0" normalizeH="0" baseline="0" noProof="0" dirty="0">
-                <a:ln>
-                  <a:noFill/>
-                </a:ln>
-                <a:solidFill>
-                  <a:srgbClr val="AEB5BD"/>
-                </a:solidFill>
-                <a:effectLst/>
-                <a:uLnTx/>
-                <a:uFillTx/>
-                <a:latin typeface="Courier New" panose="02070309020205020404" pitchFamily="49" charset="0"/>
-                <a:ea typeface="+mn-ea"/>
-                <a:cs typeface="Courier New" panose="02070309020205020404" pitchFamily="49" charset="0"/>
-              </a:rPr>
-            </a:br>
-            <a:r>
-              <a:rPr kumimoji="0" lang="en-US" altLang="en-US" sz="1400" b="0" i="0" u="none" strike="noStrike" kern="1200" cap="none" spc="0" normalizeH="0" baseline="0" noProof="0" dirty="0">
-                <a:ln>
-                  <a:noFill/>
-                </a:ln>
-                <a:solidFill>
-                  <a:srgbClr val="AEB5BD"/>
-                </a:solidFill>
-                <a:effectLst/>
-                <a:uLnTx/>
-                <a:uFillTx/>
-                <a:latin typeface="Courier New" panose="02070309020205020404" pitchFamily="49" charset="0"/>
-                <a:ea typeface="+mn-ea"/>
-                <a:cs typeface="Courier New" panose="02070309020205020404" pitchFamily="49" charset="0"/>
-              </a:rPr>
-              <a:t>            (</a:t>
-            </a:r>
-            <a:r>
-              <a:rPr kumimoji="0" lang="en-US" altLang="en-US" sz="1400" b="0" i="0" u="none" strike="noStrike" kern="1200" cap="none" spc="0" normalizeH="0" baseline="0" noProof="0" dirty="0">
-                <a:ln>
-                  <a:noFill/>
-                </a:ln>
-                <a:solidFill>
-                  <a:srgbClr val="A9B7C6"/>
-                </a:solidFill>
-                <a:effectLst/>
-                <a:uLnTx/>
-                <a:uFillTx/>
-                <a:latin typeface="Courier New" panose="02070309020205020404" pitchFamily="49" charset="0"/>
-                <a:ea typeface="+mn-ea"/>
-                <a:cs typeface="Courier New" panose="02070309020205020404" pitchFamily="49" charset="0"/>
-              </a:rPr>
-              <a:t>max </a:t>
-            </a:r>
-            <a:r>
-              <a:rPr kumimoji="0" lang="en-US" altLang="en-US" sz="1400" b="0" i="0" u="none" strike="noStrike" kern="1200" cap="none" spc="0" normalizeH="0" baseline="0" noProof="0" dirty="0">
-                <a:ln>
-                  <a:noFill/>
-                </a:ln>
-                <a:solidFill>
-                  <a:srgbClr val="AEB5BD"/>
-                </a:solidFill>
-                <a:effectLst/>
-                <a:uLnTx/>
-                <a:uFillTx/>
-                <a:latin typeface="Courier New" panose="02070309020205020404" pitchFamily="49" charset="0"/>
-                <a:ea typeface="+mn-ea"/>
-                <a:cs typeface="Courier New" panose="02070309020205020404" pitchFamily="49" charset="0"/>
-              </a:rPr>
-              <a:t>== </a:t>
-            </a:r>
-            <a:r>
-              <a:rPr kumimoji="0" lang="en-US" altLang="en-US" sz="1400" b="0" i="0" u="none" strike="noStrike" kern="1200" cap="none" spc="0" normalizeH="0" baseline="0" noProof="0" dirty="0">
-                <a:ln>
-                  <a:noFill/>
-                </a:ln>
-                <a:solidFill>
-                  <a:srgbClr val="A9B7C6"/>
-                </a:solidFill>
-                <a:effectLst/>
-                <a:uLnTx/>
-                <a:uFillTx/>
-                <a:latin typeface="Courier New" panose="02070309020205020404" pitchFamily="49" charset="0"/>
-                <a:ea typeface="+mn-ea"/>
-                <a:cs typeface="Courier New" panose="02070309020205020404" pitchFamily="49" charset="0"/>
-              </a:rPr>
-              <a:t>c </a:t>
-            </a:r>
-            <a:r>
-              <a:rPr kumimoji="0" lang="en-US" altLang="en-US" sz="1400" b="0" i="0" u="none" strike="noStrike" kern="1200" cap="none" spc="0" normalizeH="0" baseline="0" noProof="0" dirty="0">
-                <a:ln>
-                  <a:noFill/>
-                </a:ln>
-                <a:solidFill>
-                  <a:srgbClr val="AEB5BD"/>
-                </a:solidFill>
-                <a:effectLst/>
-                <a:uLnTx/>
-                <a:uFillTx/>
-                <a:latin typeface="Courier New" panose="02070309020205020404" pitchFamily="49" charset="0"/>
-                <a:ea typeface="+mn-ea"/>
-                <a:cs typeface="Courier New" panose="02070309020205020404" pitchFamily="49" charset="0"/>
-              </a:rPr>
-              <a:t>&amp;&amp; </a:t>
-            </a:r>
-            <a:r>
-              <a:rPr kumimoji="0" lang="en-US" altLang="en-US" sz="1400" b="0" i="0" u="none" strike="noStrike" kern="1200" cap="none" spc="0" normalizeH="0" baseline="0" noProof="0" dirty="0">
-                <a:ln>
-                  <a:noFill/>
-                </a:ln>
-                <a:solidFill>
-                  <a:srgbClr val="A9B7C6"/>
-                </a:solidFill>
-                <a:effectLst/>
-                <a:uLnTx/>
-                <a:uFillTx/>
-                <a:latin typeface="Courier New" panose="02070309020205020404" pitchFamily="49" charset="0"/>
-                <a:ea typeface="+mn-ea"/>
-                <a:cs typeface="Courier New" panose="02070309020205020404" pitchFamily="49" charset="0"/>
-              </a:rPr>
-              <a:t>max </a:t>
-            </a:r>
-            <a:r>
-              <a:rPr kumimoji="0" lang="en-US" altLang="en-US" sz="1400" b="0" i="0" u="none" strike="noStrike" kern="1200" cap="none" spc="0" normalizeH="0" baseline="0" noProof="0" dirty="0">
-                <a:ln>
-                  <a:noFill/>
-                </a:ln>
-                <a:solidFill>
-                  <a:srgbClr val="AEB5BD"/>
-                </a:solidFill>
-                <a:effectLst/>
-                <a:uLnTx/>
-                <a:uFillTx/>
-                <a:latin typeface="Courier New" panose="02070309020205020404" pitchFamily="49" charset="0"/>
-                <a:ea typeface="+mn-ea"/>
-                <a:cs typeface="Courier New" panose="02070309020205020404" pitchFamily="49" charset="0"/>
-              </a:rPr>
-              <a:t>-</a:t>
-            </a:r>
-            <a:r>
-              <a:rPr kumimoji="0" lang="en-US" altLang="en-US" sz="1400" b="0" i="0" u="none" strike="noStrike" kern="1200" cap="none" spc="0" normalizeH="0" baseline="0" noProof="0" dirty="0">
-                <a:ln>
-                  <a:noFill/>
-                </a:ln>
-                <a:solidFill>
-                  <a:srgbClr val="A9B7C6"/>
-                </a:solidFill>
-                <a:effectLst/>
-                <a:uLnTx/>
-                <a:uFillTx/>
-                <a:latin typeface="Courier New" panose="02070309020205020404" pitchFamily="49" charset="0"/>
-                <a:ea typeface="+mn-ea"/>
-                <a:cs typeface="Courier New" panose="02070309020205020404" pitchFamily="49" charset="0"/>
-              </a:rPr>
-              <a:t>a </a:t>
-            </a:r>
-            <a:r>
-              <a:rPr kumimoji="0" lang="en-US" altLang="en-US" sz="1400" b="0" i="0" u="none" strike="noStrike" kern="1200" cap="none" spc="0" normalizeH="0" baseline="0" noProof="0" dirty="0">
-                <a:ln>
-                  <a:noFill/>
-                </a:ln>
-                <a:solidFill>
-                  <a:srgbClr val="AEB5BD"/>
-                </a:solidFill>
-                <a:effectLst/>
-                <a:uLnTx/>
-                <a:uFillTx/>
-                <a:latin typeface="Courier New" panose="02070309020205020404" pitchFamily="49" charset="0"/>
-                <a:ea typeface="+mn-ea"/>
-                <a:cs typeface="Courier New" panose="02070309020205020404" pitchFamily="49" charset="0"/>
-              </a:rPr>
-              <a:t>-</a:t>
-            </a:r>
-            <a:r>
-              <a:rPr kumimoji="0" lang="en-US" altLang="en-US" sz="1400" b="0" i="0" u="none" strike="noStrike" kern="1200" cap="none" spc="0" normalizeH="0" baseline="0" noProof="0" dirty="0">
-                <a:ln>
-                  <a:noFill/>
-                </a:ln>
-                <a:solidFill>
-                  <a:srgbClr val="A9B7C6"/>
-                </a:solidFill>
-                <a:effectLst/>
-                <a:uLnTx/>
-                <a:uFillTx/>
-                <a:latin typeface="Courier New" panose="02070309020205020404" pitchFamily="49" charset="0"/>
-                <a:ea typeface="+mn-ea"/>
-                <a:cs typeface="Courier New" panose="02070309020205020404" pitchFamily="49" charset="0"/>
-              </a:rPr>
-              <a:t>b </a:t>
-            </a:r>
-            <a:r>
-              <a:rPr kumimoji="0" lang="en-US" altLang="en-US" sz="1400" b="0" i="0" u="none" strike="noStrike" kern="1200" cap="none" spc="0" normalizeH="0" baseline="0" noProof="0" dirty="0">
-                <a:ln>
-                  <a:noFill/>
-                </a:ln>
-                <a:solidFill>
-                  <a:srgbClr val="AEB5BD"/>
-                </a:solidFill>
-                <a:effectLst/>
-                <a:uLnTx/>
-                <a:uFillTx/>
-                <a:latin typeface="Courier New" panose="02070309020205020404" pitchFamily="49" charset="0"/>
-                <a:ea typeface="+mn-ea"/>
-                <a:cs typeface="Courier New" panose="02070309020205020404" pitchFamily="49" charset="0"/>
-              </a:rPr>
-              <a:t>&gt;= </a:t>
-            </a:r>
-            <a:r>
-              <a:rPr kumimoji="0" lang="en-US" altLang="en-US" sz="1400" b="0" i="0" u="none" strike="noStrike" kern="1200" cap="none" spc="0" normalizeH="0" baseline="0" noProof="0" dirty="0">
-                <a:ln>
-                  <a:noFill/>
-                </a:ln>
-                <a:solidFill>
-                  <a:srgbClr val="267DFF"/>
-                </a:solidFill>
-                <a:effectLst/>
-                <a:uLnTx/>
-                <a:uFillTx/>
-                <a:latin typeface="Courier New" panose="02070309020205020404" pitchFamily="49" charset="0"/>
-                <a:ea typeface="+mn-ea"/>
-                <a:cs typeface="Courier New" panose="02070309020205020404" pitchFamily="49" charset="0"/>
-              </a:rPr>
-              <a:t>0 </a:t>
-            </a:r>
-            <a:r>
-              <a:rPr kumimoji="0" lang="en-US" altLang="en-US" sz="1400" b="0" i="0" u="none" strike="noStrike" kern="1200" cap="none" spc="0" normalizeH="0" baseline="0" noProof="0" dirty="0">
-                <a:ln>
-                  <a:noFill/>
-                </a:ln>
-                <a:solidFill>
-                  <a:srgbClr val="AEB5BD"/>
-                </a:solidFill>
-                <a:effectLst/>
-                <a:uLnTx/>
-                <a:uFillTx/>
-                <a:latin typeface="Courier New" panose="02070309020205020404" pitchFamily="49" charset="0"/>
-                <a:ea typeface="+mn-ea"/>
-                <a:cs typeface="Courier New" panose="02070309020205020404" pitchFamily="49" charset="0"/>
-              </a:rPr>
-              <a:t>) ){</a:t>
-            </a:r>
-            <a:br>
-              <a:rPr kumimoji="0" lang="en-US" altLang="en-US" sz="1400" b="0" i="0" u="none" strike="noStrike" kern="1200" cap="none" spc="0" normalizeH="0" baseline="0" noProof="0" dirty="0">
-                <a:ln>
-                  <a:noFill/>
-                </a:ln>
-                <a:solidFill>
-                  <a:srgbClr val="AEB5BD"/>
-                </a:solidFill>
-                <a:effectLst/>
-                <a:uLnTx/>
-                <a:uFillTx/>
-                <a:latin typeface="Courier New" panose="02070309020205020404" pitchFamily="49" charset="0"/>
-                <a:ea typeface="+mn-ea"/>
-                <a:cs typeface="Courier New" panose="02070309020205020404" pitchFamily="49" charset="0"/>
-              </a:rPr>
-            </a:br>
-            <a:r>
-              <a:rPr kumimoji="0" lang="en-US" altLang="en-US" sz="1400" b="0" i="0" u="none" strike="noStrike" kern="1200" cap="none" spc="0" normalizeH="0" baseline="0" noProof="0" dirty="0">
-                <a:ln>
-                  <a:noFill/>
-                </a:ln>
-                <a:solidFill>
-                  <a:srgbClr val="AEB5BD"/>
-                </a:solidFill>
-                <a:effectLst/>
-                <a:uLnTx/>
-                <a:uFillTx/>
-                <a:latin typeface="Courier New" panose="02070309020205020404" pitchFamily="49" charset="0"/>
-                <a:ea typeface="+mn-ea"/>
-                <a:cs typeface="Courier New" panose="02070309020205020404" pitchFamily="49" charset="0"/>
-              </a:rPr>
-              <a:t>        </a:t>
-            </a:r>
-            <a:r>
-              <a:rPr kumimoji="0" lang="en-US" altLang="en-US" sz="1400" b="0" i="0" u="none" strike="noStrike" kern="1200" cap="none" spc="0" normalizeH="0" baseline="0" noProof="0" dirty="0">
-                <a:ln>
-                  <a:noFill/>
-                </a:ln>
-                <a:solidFill>
-                  <a:srgbClr val="597CC2"/>
-                </a:solidFill>
-                <a:effectLst/>
-                <a:uLnTx/>
-                <a:uFillTx/>
-                <a:latin typeface="Courier New" panose="02070309020205020404" pitchFamily="49" charset="0"/>
-                <a:ea typeface="+mn-ea"/>
-                <a:cs typeface="Courier New" panose="02070309020205020404" pitchFamily="49" charset="0"/>
-              </a:rPr>
-              <a:t>return </a:t>
-            </a:r>
-            <a:r>
-              <a:rPr kumimoji="0" lang="en-US" altLang="en-US" sz="1400" b="0" i="0" u="none" strike="noStrike" kern="1200" cap="none" spc="0" normalizeH="0" baseline="0" noProof="0" dirty="0" err="1">
-                <a:ln>
-                  <a:noFill/>
-                </a:ln>
-                <a:solidFill>
-                  <a:srgbClr val="A9B7C6"/>
-                </a:solidFill>
-                <a:effectLst/>
-                <a:uLnTx/>
-                <a:uFillTx/>
-                <a:latin typeface="Courier New" panose="02070309020205020404" pitchFamily="49" charset="0"/>
-                <a:ea typeface="+mn-ea"/>
-                <a:cs typeface="Courier New" panose="02070309020205020404" pitchFamily="49" charset="0"/>
-              </a:rPr>
-              <a:t>Classification</a:t>
-            </a:r>
-            <a:r>
-              <a:rPr kumimoji="0" lang="en-US" altLang="en-US" sz="1400" b="0" i="0" u="none" strike="noStrike" kern="1200" cap="none" spc="0" normalizeH="0" baseline="0" noProof="0" dirty="0" err="1">
-                <a:ln>
-                  <a:noFill/>
-                </a:ln>
-                <a:solidFill>
-                  <a:srgbClr val="AEB5BD"/>
-                </a:solidFill>
-                <a:effectLst/>
-                <a:uLnTx/>
-                <a:uFillTx/>
-                <a:latin typeface="Courier New" panose="02070309020205020404" pitchFamily="49" charset="0"/>
-                <a:ea typeface="+mn-ea"/>
-                <a:cs typeface="Courier New" panose="02070309020205020404" pitchFamily="49" charset="0"/>
-              </a:rPr>
-              <a:t>.</a:t>
-            </a:r>
-            <a:r>
-              <a:rPr kumimoji="0" lang="en-US" altLang="en-US" sz="1400" b="0" i="1" u="none" strike="noStrike" kern="1200" cap="none" spc="0" normalizeH="0" baseline="0" noProof="0" dirty="0" err="1">
-                <a:ln>
-                  <a:noFill/>
-                </a:ln>
-                <a:solidFill>
-                  <a:srgbClr val="828EBA"/>
-                </a:solidFill>
-                <a:effectLst/>
-                <a:uLnTx/>
-                <a:uFillTx/>
-                <a:latin typeface="Courier New" panose="02070309020205020404" pitchFamily="49" charset="0"/>
-                <a:ea typeface="+mn-ea"/>
-                <a:cs typeface="Courier New" panose="02070309020205020404" pitchFamily="49" charset="0"/>
-              </a:rPr>
-              <a:t>NOT_A_TRIANGLE</a:t>
-            </a:r>
-            <a:r>
-              <a:rPr kumimoji="0" lang="en-US" altLang="en-US" sz="1400" b="0" i="0" u="none" strike="noStrike" kern="1200" cap="none" spc="0" normalizeH="0" baseline="0" noProof="0" dirty="0">
-                <a:ln>
-                  <a:noFill/>
-                </a:ln>
-                <a:solidFill>
-                  <a:srgbClr val="597CC2"/>
-                </a:solidFill>
-                <a:effectLst/>
-                <a:uLnTx/>
-                <a:uFillTx/>
-                <a:latin typeface="Courier New" panose="02070309020205020404" pitchFamily="49" charset="0"/>
-                <a:ea typeface="+mn-ea"/>
-                <a:cs typeface="Courier New" panose="02070309020205020404" pitchFamily="49" charset="0"/>
-              </a:rPr>
-              <a:t>;</a:t>
-            </a:r>
-            <a:br>
-              <a:rPr kumimoji="0" lang="en-US" altLang="en-US" sz="1400" b="0" i="0" u="none" strike="noStrike" kern="1200" cap="none" spc="0" normalizeH="0" baseline="0" noProof="0" dirty="0">
-                <a:ln>
-                  <a:noFill/>
-                </a:ln>
-                <a:solidFill>
-                  <a:srgbClr val="597CC2"/>
-                </a:solidFill>
-                <a:effectLst/>
-                <a:uLnTx/>
-                <a:uFillTx/>
-                <a:latin typeface="Courier New" panose="02070309020205020404" pitchFamily="49" charset="0"/>
-                <a:ea typeface="+mn-ea"/>
-                <a:cs typeface="Courier New" panose="02070309020205020404" pitchFamily="49" charset="0"/>
-              </a:rPr>
-            </a:br>
-            <a:r>
-              <a:rPr kumimoji="0" lang="en-US" altLang="en-US" sz="1400" b="0" i="0" u="none" strike="noStrike" kern="1200" cap="none" spc="0" normalizeH="0" baseline="0" noProof="0" dirty="0">
-                <a:ln>
-                  <a:noFill/>
-                </a:ln>
-                <a:solidFill>
-                  <a:srgbClr val="597CC2"/>
-                </a:solidFill>
-                <a:effectLst/>
-                <a:uLnTx/>
-                <a:uFillTx/>
-                <a:latin typeface="Courier New" panose="02070309020205020404" pitchFamily="49" charset="0"/>
-                <a:ea typeface="+mn-ea"/>
-                <a:cs typeface="Courier New" panose="02070309020205020404" pitchFamily="49" charset="0"/>
-              </a:rPr>
-              <a:t>    </a:t>
-            </a:r>
-            <a:r>
-              <a:rPr kumimoji="0" lang="en-US" altLang="en-US" sz="1400" b="0" i="0" u="none" strike="noStrike" kern="1200" cap="none" spc="0" normalizeH="0" baseline="0" noProof="0" dirty="0">
-                <a:ln>
-                  <a:noFill/>
-                </a:ln>
-                <a:solidFill>
-                  <a:srgbClr val="AEB5BD"/>
-                </a:solidFill>
-                <a:effectLst/>
-                <a:uLnTx/>
-                <a:uFillTx/>
-                <a:latin typeface="Courier New" panose="02070309020205020404" pitchFamily="49" charset="0"/>
-                <a:ea typeface="+mn-ea"/>
-                <a:cs typeface="Courier New" panose="02070309020205020404" pitchFamily="49" charset="0"/>
-              </a:rPr>
-              <a:t>}</a:t>
-            </a:r>
-            <a:br>
-              <a:rPr kumimoji="0" lang="en-US" altLang="en-US" sz="1400" b="0" i="0" u="none" strike="noStrike" kern="1200" cap="none" spc="0" normalizeH="0" baseline="0" noProof="0" dirty="0">
-                <a:ln>
-                  <a:noFill/>
-                </a:ln>
-                <a:solidFill>
-                  <a:srgbClr val="AEB5BD"/>
-                </a:solidFill>
-                <a:effectLst/>
-                <a:uLnTx/>
-                <a:uFillTx/>
-                <a:latin typeface="Courier New" panose="02070309020205020404" pitchFamily="49" charset="0"/>
-                <a:ea typeface="+mn-ea"/>
-                <a:cs typeface="Courier New" panose="02070309020205020404" pitchFamily="49" charset="0"/>
-              </a:rPr>
-            </a:br>
-            <a:r>
-              <a:rPr kumimoji="0" lang="en-US" altLang="en-US" sz="1400" b="0" i="0" u="none" strike="noStrike" kern="1200" cap="none" spc="0" normalizeH="0" baseline="0" noProof="0" dirty="0">
-                <a:ln>
-                  <a:noFill/>
-                </a:ln>
-                <a:solidFill>
-                  <a:srgbClr val="AEB5BD"/>
-                </a:solidFill>
-                <a:effectLst/>
-                <a:uLnTx/>
-                <a:uFillTx/>
-                <a:latin typeface="Courier New" panose="02070309020205020404" pitchFamily="49" charset="0"/>
-                <a:ea typeface="+mn-ea"/>
-                <a:cs typeface="Courier New" panose="02070309020205020404" pitchFamily="49" charset="0"/>
-              </a:rPr>
-              <a:t/>
-            </a:r>
             <a:br>
               <a:rPr kumimoji="0" lang="en-US" altLang="en-US" sz="1400" b="0" i="0" u="none" strike="noStrike" kern="1200" cap="none" spc="0" normalizeH="0" baseline="0" noProof="0" dirty="0">
                 <a:ln>
@@ -9582,23 +9483,22 @@
               <a:rPr lang="en-US" dirty="0"/>
               <a:t>are used when dealing with external services </a:t>
             </a:r>
-            <a:endParaRPr lang="en-US" dirty="0" smtClean="0"/>
-          </a:p>
-          <a:p>
-            <a:r>
-              <a:rPr lang="en-US" dirty="0" smtClean="0"/>
+          </a:p>
+          <a:p>
+            <a:r>
+              <a:rPr lang="en-US" dirty="0"/>
               <a:t>A look at </a:t>
             </a:r>
             <a:r>
-              <a:rPr lang="en-US" i="1" dirty="0" smtClean="0"/>
+              <a:rPr lang="en-US" i="1" dirty="0"/>
               <a:t>advanced research topics </a:t>
             </a:r>
             <a:r>
-              <a:rPr lang="en-US" dirty="0" smtClean="0"/>
+              <a:rPr lang="en-US" dirty="0"/>
               <a:t>like </a:t>
             </a:r>
             <a:r>
-              <a:rPr lang="en-US" i="1" dirty="0" smtClean="0"/>
+              <a:rPr lang="en-US" i="1" dirty="0"/>
               <a:t>Automated Test Generation</a:t>
             </a:r>
           </a:p>
@@ -10782,15 +10682,7 @@
           <a:p>
             <a:r>
               <a:rPr lang="en-US" sz="3600" dirty="0"/>
-              <a:t>Very few </a:t>
-            </a:r>
-            <a:r>
-              <a:rPr lang="en-US" sz="3600" dirty="0" smtClean="0"/>
-              <a:t>research papers </a:t>
-            </a:r>
-            <a:r>
-              <a:rPr lang="en-US" sz="3600" dirty="0"/>
-              <a:t>on testing REST</a:t>
+              <a:t>Very few research papers on testing REST</a:t>
             </a:r>
           </a:p>
           <a:p>
@@ -11747,11 +11639,11 @@
           <a:lstStyle/>
           <a:p>
             <a:r>
-              <a:rPr lang="en-US" dirty="0" smtClean="0"/>
+              <a:rPr lang="en-US" dirty="0"/>
               <a:t>Using </a:t>
             </a:r>
             <a:r>
-              <a:rPr lang="en-US" dirty="0" err="1" smtClean="0"/>
+              <a:rPr lang="en-US" dirty="0" err="1"/>
               <a:t>EvoMaster</a:t>
             </a:r>
             <a:endParaRPr lang="en-US" dirty="0"/>
@@ -11779,60 +11671,51 @@
           <a:lstStyle/>
           <a:p>
             <a:r>
-              <a:rPr lang="en-US" dirty="0" smtClean="0"/>
+              <a:rPr lang="en-US" dirty="0"/>
               <a:t>Need to add dependency library</a:t>
             </a:r>
           </a:p>
           <a:p>
             <a:r>
-              <a:rPr lang="en-US" dirty="0" smtClean="0"/>
-              <a:t>Need to write a driver </a:t>
-            </a:r>
-            <a:r>
               <a:rPr lang="en-US" dirty="0"/>
-              <a:t>class </a:t>
-            </a:r>
-            <a:r>
-              <a:rPr lang="en-US" dirty="0" smtClean="0"/>
-              <a:t>extending </a:t>
-            </a:r>
-            <a:r>
-              <a:rPr lang="en-US" i="1" dirty="0" err="1" smtClean="0"/>
+              <a:t>Need to write a driver class extending </a:t>
+            </a:r>
+            <a:r>
+              <a:rPr lang="en-US" i="1" dirty="0" err="1"/>
               <a:t>EmbeddedSutController</a:t>
             </a:r>
-            <a:endParaRPr lang="en-US" i="1" dirty="0" smtClean="0"/>
-          </a:p>
-          <a:p>
-            <a:r>
-              <a:rPr lang="en-US" dirty="0" smtClean="0"/>
+            <a:endParaRPr lang="en-US" i="1" dirty="0"/>
+          </a:p>
+          <a:p>
+            <a:r>
+              <a:rPr lang="en-US" dirty="0"/>
               <a:t>Once driver is up and running, should run “</a:t>
             </a:r>
             <a:r>
-              <a:rPr lang="en-US" i="1" dirty="0" smtClean="0"/>
+              <a:rPr lang="en-US" i="1" dirty="0"/>
               <a:t>evomaster.jar</a:t>
             </a:r>
             <a:r>
-              <a:rPr lang="en-US" dirty="0" smtClean="0"/>
+              <a:rPr lang="en-US" dirty="0"/>
               <a:t>” from command-line</a:t>
             </a:r>
           </a:p>
           <a:p>
             <a:pPr lvl="1"/>
             <a:r>
-              <a:rPr lang="en-US" dirty="0" smtClean="0"/>
+              <a:rPr lang="en-US" dirty="0"/>
               <a:t>once downloaded from GitHub</a:t>
             </a:r>
           </a:p>
           <a:p>
             <a:r>
-              <a:rPr lang="en-US" dirty="0" smtClean="0"/>
+              <a:rPr lang="en-US" dirty="0"/>
               <a:t>More info at </a:t>
             </a:r>
             <a:r>
-              <a:rPr lang="en-US" i="1" dirty="0" smtClean="0"/>
+              <a:rPr lang="en-US" i="1" dirty="0"/>
               <a:t>www.evomaster.org</a:t>
             </a:r>
-            <a:endParaRPr lang="en-US" i="1" dirty="0"/>
           </a:p>
         </p:txBody>
       </p:sp>
@@ -11933,17 +11816,17 @@
           </a:p>
           <a:p>
             <a:r>
-              <a:rPr lang="en-US" b="1" dirty="0" smtClean="0"/>
+              <a:rPr lang="en-US" b="1" dirty="0"/>
               <a:t>advanced/rest/circuit-breaker</a:t>
             </a:r>
           </a:p>
           <a:p>
             <a:r>
-              <a:rPr lang="en-US" b="1" dirty="0" smtClean="0"/>
+              <a:rPr lang="en-US" b="1" dirty="0"/>
               <a:t>advanced/rest/</a:t>
             </a:r>
             <a:r>
-              <a:rPr lang="en-US" b="1" dirty="0" err="1" smtClean="0"/>
+              <a:rPr lang="en-US" b="1" dirty="0" err="1"/>
               <a:t>evomaster</a:t>
             </a:r>
             <a:endParaRPr lang="en-US" b="1" dirty="0"/>
@@ -13296,15 +13179,7 @@
             </a:pPr>
             <a:r>
               <a:rPr lang="en-US" sz="3600" dirty="0"/>
-              <a:t>Can use a library </a:t>
-            </a:r>
-            <a:r>
-              <a:rPr lang="en-US" sz="3600" dirty="0" smtClean="0"/>
-              <a:t>to </a:t>
-            </a:r>
-            <a:r>
-              <a:rPr lang="en-US" sz="3600" dirty="0"/>
-              <a:t>wrap each call to external services</a:t>
+              <a:t>Can use a library to wrap each call to external services</a:t>
             </a:r>
           </a:p>
           <a:p>

</xml_diff>